<commit_message>
Finished incorporating Daniel's recommended revisions
</commit_message>
<xml_diff>
--- a/figures/fig-1/fig-1.pptx
+++ b/figures/fig-1/fig-1.pptx
@@ -197,7 +197,7 @@
           <a:p>
             <a:fld id="{D56CEF8C-C275-5B4D-A6F9-44239AED55DF}" type="datetimeFigureOut">
               <a:rPr lang="en-US" smtClean="0"/>
-              <a:t>9/23/25</a:t>
+              <a:t>9/24/25</a:t>
             </a:fld>
             <a:endParaRPr lang="en-US"/>
           </a:p>
@@ -684,7 +684,7 @@
           <a:p>
             <a:fld id="{FE14D9E9-5EC3-D444-8E38-E43C59FC4D54}" type="datetimeFigureOut">
               <a:rPr lang="en-US" smtClean="0"/>
-              <a:t>9/23/25</a:t>
+              <a:t>9/24/25</a:t>
             </a:fld>
             <a:endParaRPr lang="en-US"/>
           </a:p>
@@ -854,7 +854,7 @@
           <a:p>
             <a:fld id="{FE14D9E9-5EC3-D444-8E38-E43C59FC4D54}" type="datetimeFigureOut">
               <a:rPr lang="en-US" smtClean="0"/>
-              <a:t>9/23/25</a:t>
+              <a:t>9/24/25</a:t>
             </a:fld>
             <a:endParaRPr lang="en-US"/>
           </a:p>
@@ -1034,7 +1034,7 @@
           <a:p>
             <a:fld id="{FE14D9E9-5EC3-D444-8E38-E43C59FC4D54}" type="datetimeFigureOut">
               <a:rPr lang="en-US" smtClean="0"/>
-              <a:t>9/23/25</a:t>
+              <a:t>9/24/25</a:t>
             </a:fld>
             <a:endParaRPr lang="en-US"/>
           </a:p>
@@ -1204,7 +1204,7 @@
           <a:p>
             <a:fld id="{FE14D9E9-5EC3-D444-8E38-E43C59FC4D54}" type="datetimeFigureOut">
               <a:rPr lang="en-US" smtClean="0"/>
-              <a:t>9/23/25</a:t>
+              <a:t>9/24/25</a:t>
             </a:fld>
             <a:endParaRPr lang="en-US"/>
           </a:p>
@@ -1450,7 +1450,7 @@
           <a:p>
             <a:fld id="{FE14D9E9-5EC3-D444-8E38-E43C59FC4D54}" type="datetimeFigureOut">
               <a:rPr lang="en-US" smtClean="0"/>
-              <a:t>9/23/25</a:t>
+              <a:t>9/24/25</a:t>
             </a:fld>
             <a:endParaRPr lang="en-US"/>
           </a:p>
@@ -1682,7 +1682,7 @@
           <a:p>
             <a:fld id="{FE14D9E9-5EC3-D444-8E38-E43C59FC4D54}" type="datetimeFigureOut">
               <a:rPr lang="en-US" smtClean="0"/>
-              <a:t>9/23/25</a:t>
+              <a:t>9/24/25</a:t>
             </a:fld>
             <a:endParaRPr lang="en-US"/>
           </a:p>
@@ -2049,7 +2049,7 @@
           <a:p>
             <a:fld id="{FE14D9E9-5EC3-D444-8E38-E43C59FC4D54}" type="datetimeFigureOut">
               <a:rPr lang="en-US" smtClean="0"/>
-              <a:t>9/23/25</a:t>
+              <a:t>9/24/25</a:t>
             </a:fld>
             <a:endParaRPr lang="en-US"/>
           </a:p>
@@ -2167,7 +2167,7 @@
           <a:p>
             <a:fld id="{FE14D9E9-5EC3-D444-8E38-E43C59FC4D54}" type="datetimeFigureOut">
               <a:rPr lang="en-US" smtClean="0"/>
-              <a:t>9/23/25</a:t>
+              <a:t>9/24/25</a:t>
             </a:fld>
             <a:endParaRPr lang="en-US"/>
           </a:p>
@@ -2262,7 +2262,7 @@
           <a:p>
             <a:fld id="{FE14D9E9-5EC3-D444-8E38-E43C59FC4D54}" type="datetimeFigureOut">
               <a:rPr lang="en-US" smtClean="0"/>
-              <a:t>9/23/25</a:t>
+              <a:t>9/24/25</a:t>
             </a:fld>
             <a:endParaRPr lang="en-US"/>
           </a:p>
@@ -2539,7 +2539,7 @@
           <a:p>
             <a:fld id="{FE14D9E9-5EC3-D444-8E38-E43C59FC4D54}" type="datetimeFigureOut">
               <a:rPr lang="en-US" smtClean="0"/>
-              <a:t>9/23/25</a:t>
+              <a:t>9/24/25</a:t>
             </a:fld>
             <a:endParaRPr lang="en-US"/>
           </a:p>
@@ -2796,7 +2796,7 @@
           <a:p>
             <a:fld id="{FE14D9E9-5EC3-D444-8E38-E43C59FC4D54}" type="datetimeFigureOut">
               <a:rPr lang="en-US" smtClean="0"/>
-              <a:t>9/23/25</a:t>
+              <a:t>9/24/25</a:t>
             </a:fld>
             <a:endParaRPr lang="en-US"/>
           </a:p>
@@ -3009,7 +3009,7 @@
           <a:p>
             <a:fld id="{FE14D9E9-5EC3-D444-8E38-E43C59FC4D54}" type="datetimeFigureOut">
               <a:rPr lang="en-US" smtClean="0"/>
-              <a:t>9/23/25</a:t>
+              <a:t>9/24/25</a:t>
             </a:fld>
             <a:endParaRPr lang="en-US"/>
           </a:p>
@@ -3416,10 +3416,10 @@
       </p:grpSpPr>
       <p:grpSp>
         <p:nvGrpSpPr>
-          <p:cNvPr id="28" name="Group 27">
+          <p:cNvPr id="29" name="Group 28">
             <a:extLst>
               <a:ext uri="{FF2B5EF4-FFF2-40B4-BE49-F238E27FC236}">
-                <a16:creationId xmlns:a16="http://schemas.microsoft.com/office/drawing/2014/main" id="{56607096-CFC2-85B5-90FE-2AAB7EA0A106}"/>
+                <a16:creationId xmlns:a16="http://schemas.microsoft.com/office/drawing/2014/main" id="{1879FEAA-0A4F-5526-0660-865578141E59}"/>
               </a:ext>
             </a:extLst>
           </p:cNvPr>
@@ -3430,16 +3430,1970 @@
           <a:xfrm>
             <a:off x="124929" y="80313"/>
             <a:ext cx="6338266" cy="2216711"/>
-            <a:chOff x="62464" y="828129"/>
+            <a:chOff x="124929" y="80313"/>
             <a:chExt cx="6338266" cy="2216711"/>
           </a:xfrm>
         </p:grpSpPr>
+        <p:grpSp>
+          <p:nvGrpSpPr>
+            <p:cNvPr id="28" name="Group 27">
+              <a:extLst>
+                <a:ext uri="{FF2B5EF4-FFF2-40B4-BE49-F238E27FC236}">
+                  <a16:creationId xmlns:a16="http://schemas.microsoft.com/office/drawing/2014/main" id="{56607096-CFC2-85B5-90FE-2AAB7EA0A106}"/>
+                </a:ext>
+              </a:extLst>
+            </p:cNvPr>
+            <p:cNvGrpSpPr/>
+            <p:nvPr/>
+          </p:nvGrpSpPr>
+          <p:grpSpPr>
+            <a:xfrm>
+              <a:off x="124929" y="80313"/>
+              <a:ext cx="6338266" cy="2216711"/>
+              <a:chOff x="62464" y="828129"/>
+              <a:chExt cx="6338266" cy="2216711"/>
+            </a:xfrm>
+          </p:grpSpPr>
+          <p:sp>
+            <p:nvSpPr>
+              <p:cNvPr id="2" name="TextBox 1">
+                <a:extLst>
+                  <a:ext uri="{FF2B5EF4-FFF2-40B4-BE49-F238E27FC236}">
+                    <a16:creationId xmlns:a16="http://schemas.microsoft.com/office/drawing/2014/main" id="{9EE20482-83F3-E704-19BC-C7CA6E0219D4}"/>
+                  </a:ext>
+                </a:extLst>
+              </p:cNvPr>
+              <p:cNvSpPr txBox="1"/>
+              <p:nvPr/>
+            </p:nvSpPr>
+            <p:spPr>
+              <a:xfrm>
+                <a:off x="62471" y="1230620"/>
+                <a:ext cx="1007999" cy="169277"/>
+              </a:xfrm>
+              <a:prstGeom prst="rect">
+                <a:avLst/>
+              </a:prstGeom>
+              <a:solidFill>
+                <a:srgbClr val="F4B9BE">
+                  <a:alpha val="49804"/>
+                </a:srgbClr>
+              </a:solidFill>
+              <a:ln>
+                <a:noFill/>
+              </a:ln>
+            </p:spPr>
+            <p:txBody>
+              <a:bodyPr wrap="square" lIns="36000" rIns="36000" rtlCol="0">
+                <a:spAutoFit/>
+              </a:bodyPr>
+              <a:lstStyle/>
+              <a:p>
+                <a:pPr algn="ctr"/>
+                <a:r>
+                  <a:rPr lang="en-US" sz="500" dirty="0">
+                    <a:latin typeface="Arial" panose="020B0604020202020204" pitchFamily="34" charset="0"/>
+                    <a:cs typeface="Arial" panose="020B0604020202020204" pitchFamily="34" charset="0"/>
+                  </a:rPr>
+                  <a:t>chr7:g.55174772_55174786del </a:t>
+                </a:r>
+              </a:p>
+            </p:txBody>
+          </p:sp>
+          <p:sp>
+            <p:nvSpPr>
+              <p:cNvPr id="5" name="TextBox 4">
+                <a:extLst>
+                  <a:ext uri="{FF2B5EF4-FFF2-40B4-BE49-F238E27FC236}">
+                    <a16:creationId xmlns:a16="http://schemas.microsoft.com/office/drawing/2014/main" id="{D24020EF-DAE7-7580-1A27-3A677A2952E8}"/>
+                  </a:ext>
+                </a:extLst>
+              </p:cNvPr>
+              <p:cNvSpPr txBox="1"/>
+              <p:nvPr/>
+            </p:nvSpPr>
+            <p:spPr>
+              <a:xfrm>
+                <a:off x="62471" y="1568086"/>
+                <a:ext cx="1007999" cy="169277"/>
+              </a:xfrm>
+              <a:prstGeom prst="rect">
+                <a:avLst/>
+              </a:prstGeom>
+              <a:solidFill>
+                <a:srgbClr val="F4B9BE">
+                  <a:alpha val="49804"/>
+                </a:srgbClr>
+              </a:solidFill>
+              <a:ln>
+                <a:noFill/>
+              </a:ln>
+            </p:spPr>
+            <p:txBody>
+              <a:bodyPr wrap="square" lIns="36000" rIns="36000" rtlCol="0">
+                <a:spAutoFit/>
+              </a:bodyPr>
+              <a:lstStyle/>
+              <a:p>
+                <a:pPr algn="ctr"/>
+                <a:r>
+                  <a:rPr lang="en-US" sz="500" dirty="0">
+                    <a:latin typeface="Arial" panose="020B0604020202020204" pitchFamily="34" charset="0"/>
+                    <a:cs typeface="Arial" panose="020B0604020202020204" pitchFamily="34" charset="0"/>
+                  </a:rPr>
+                  <a:t>chr7:g.55174773_55174787del </a:t>
+                </a:r>
+              </a:p>
+            </p:txBody>
+          </p:sp>
+          <p:sp>
+            <p:nvSpPr>
+              <p:cNvPr id="6" name="TextBox 5">
+                <a:extLst>
+                  <a:ext uri="{FF2B5EF4-FFF2-40B4-BE49-F238E27FC236}">
+                    <a16:creationId xmlns:a16="http://schemas.microsoft.com/office/drawing/2014/main" id="{84C94FAF-6BF8-88A2-F9EC-DBC082CAEDFC}"/>
+                  </a:ext>
+                </a:extLst>
+              </p:cNvPr>
+              <p:cNvSpPr txBox="1"/>
+              <p:nvPr/>
+            </p:nvSpPr>
+            <p:spPr>
+              <a:xfrm>
+                <a:off x="1395036" y="1230620"/>
+                <a:ext cx="1007999" cy="169277"/>
+              </a:xfrm>
+              <a:prstGeom prst="rect">
+                <a:avLst/>
+              </a:prstGeom>
+              <a:solidFill>
+                <a:srgbClr val="F4B9BE">
+                  <a:alpha val="49804"/>
+                </a:srgbClr>
+              </a:solidFill>
+              <a:ln>
+                <a:noFill/>
+              </a:ln>
+            </p:spPr>
+            <p:txBody>
+              <a:bodyPr wrap="square" lIns="36000" rIns="36000" rtlCol="0">
+                <a:spAutoFit/>
+              </a:bodyPr>
+              <a:lstStyle/>
+              <a:p>
+                <a:pPr algn="ctr"/>
+                <a:r>
+                  <a:rPr lang="en-US" sz="500" dirty="0">
+                    <a:latin typeface="Arial" panose="020B0604020202020204" pitchFamily="34" charset="0"/>
+                    <a:cs typeface="Arial" panose="020B0604020202020204" pitchFamily="34" charset="0"/>
+                  </a:rPr>
+                  <a:t>NM_005228.5:c.2235_2249del</a:t>
+                </a:r>
+              </a:p>
+            </p:txBody>
+          </p:sp>
+          <p:sp>
+            <p:nvSpPr>
+              <p:cNvPr id="7" name="TextBox 6">
+                <a:extLst>
+                  <a:ext uri="{FF2B5EF4-FFF2-40B4-BE49-F238E27FC236}">
+                    <a16:creationId xmlns:a16="http://schemas.microsoft.com/office/drawing/2014/main" id="{50705F86-3F87-DDA7-EA53-07B81A7B400C}"/>
+                  </a:ext>
+                </a:extLst>
+              </p:cNvPr>
+              <p:cNvSpPr txBox="1"/>
+              <p:nvPr/>
+            </p:nvSpPr>
+            <p:spPr>
+              <a:xfrm>
+                <a:off x="1395037" y="1568086"/>
+                <a:ext cx="1007999" cy="169277"/>
+              </a:xfrm>
+              <a:prstGeom prst="rect">
+                <a:avLst/>
+              </a:prstGeom>
+              <a:solidFill>
+                <a:srgbClr val="F4B9BE">
+                  <a:alpha val="49804"/>
+                </a:srgbClr>
+              </a:solidFill>
+              <a:ln>
+                <a:noFill/>
+              </a:ln>
+            </p:spPr>
+            <p:txBody>
+              <a:bodyPr wrap="square" lIns="36000" rIns="36000" rtlCol="0">
+                <a:spAutoFit/>
+              </a:bodyPr>
+              <a:lstStyle/>
+              <a:p>
+                <a:pPr algn="ctr"/>
+                <a:r>
+                  <a:rPr lang="en-US" sz="500" dirty="0">
+                    <a:latin typeface="Arial" panose="020B0604020202020204" pitchFamily="34" charset="0"/>
+                    <a:cs typeface="Arial" panose="020B0604020202020204" pitchFamily="34" charset="0"/>
+                  </a:rPr>
+                  <a:t>NM_005228.5:c.2236_2250del</a:t>
+                </a:r>
+              </a:p>
+            </p:txBody>
+          </p:sp>
+          <p:sp>
+            <p:nvSpPr>
+              <p:cNvPr id="8" name="TextBox 7">
+                <a:extLst>
+                  <a:ext uri="{FF2B5EF4-FFF2-40B4-BE49-F238E27FC236}">
+                    <a16:creationId xmlns:a16="http://schemas.microsoft.com/office/drawing/2014/main" id="{48668156-FF50-48D8-827E-D270CE87599C}"/>
+                  </a:ext>
+                </a:extLst>
+              </p:cNvPr>
+              <p:cNvSpPr txBox="1"/>
+              <p:nvPr/>
+            </p:nvSpPr>
+            <p:spPr>
+              <a:xfrm>
+                <a:off x="2727601" y="1230620"/>
+                <a:ext cx="1007999" cy="169277"/>
+              </a:xfrm>
+              <a:prstGeom prst="rect">
+                <a:avLst/>
+              </a:prstGeom>
+              <a:solidFill>
+                <a:srgbClr val="F4B9BE">
+                  <a:alpha val="49804"/>
+                </a:srgbClr>
+              </a:solidFill>
+              <a:ln>
+                <a:noFill/>
+              </a:ln>
+            </p:spPr>
+            <p:txBody>
+              <a:bodyPr wrap="square" lIns="36000" rIns="36000" rtlCol="0">
+                <a:spAutoFit/>
+              </a:bodyPr>
+              <a:lstStyle/>
+              <a:p>
+                <a:pPr algn="ctr"/>
+                <a:r>
+                  <a:rPr lang="en-US" sz="500" dirty="0">
+                    <a:latin typeface="Arial" panose="020B0604020202020204" pitchFamily="34" charset="0"/>
+                    <a:cs typeface="Arial" panose="020B0604020202020204" pitchFamily="34" charset="0"/>
+                  </a:rPr>
+                  <a:t>NP_005219.2:p.E746_A750del</a:t>
+                </a:r>
+              </a:p>
+            </p:txBody>
+          </p:sp>
+          <p:sp>
+            <p:nvSpPr>
+              <p:cNvPr id="9" name="TextBox 8">
+                <a:extLst>
+                  <a:ext uri="{FF2B5EF4-FFF2-40B4-BE49-F238E27FC236}">
+                    <a16:creationId xmlns:a16="http://schemas.microsoft.com/office/drawing/2014/main" id="{77075C77-B677-3A1B-3EDE-A1AE597830BD}"/>
+                  </a:ext>
+                </a:extLst>
+              </p:cNvPr>
+              <p:cNvSpPr txBox="1"/>
+              <p:nvPr/>
+            </p:nvSpPr>
+            <p:spPr>
+              <a:xfrm>
+                <a:off x="2727599" y="1568086"/>
+                <a:ext cx="1007999" cy="169277"/>
+              </a:xfrm>
+              <a:prstGeom prst="rect">
+                <a:avLst/>
+              </a:prstGeom>
+              <a:solidFill>
+                <a:srgbClr val="F4B9BE">
+                  <a:alpha val="50000"/>
+                </a:srgbClr>
+              </a:solidFill>
+              <a:ln w="6350">
+                <a:noFill/>
+                <a:prstDash val="dash"/>
+              </a:ln>
+            </p:spPr>
+            <p:txBody>
+              <a:bodyPr wrap="square" lIns="36000" rIns="36000" rtlCol="0">
+                <a:spAutoFit/>
+              </a:bodyPr>
+              <a:lstStyle/>
+              <a:p>
+                <a:pPr algn="ctr"/>
+                <a:r>
+                  <a:rPr lang="en-US" sz="500" dirty="0">
+                    <a:latin typeface="Arial" panose="020B0604020202020204" pitchFamily="34" charset="0"/>
+                    <a:cs typeface="Arial" panose="020B0604020202020204" pitchFamily="34" charset="0"/>
+                  </a:rPr>
+                  <a:t>NP_005219.2:p.L747_T751del</a:t>
+                </a:r>
+              </a:p>
+            </p:txBody>
+          </p:sp>
+          <p:sp>
+            <p:nvSpPr>
+              <p:cNvPr id="10" name="TextBox 9">
+                <a:extLst>
+                  <a:ext uri="{FF2B5EF4-FFF2-40B4-BE49-F238E27FC236}">
+                    <a16:creationId xmlns:a16="http://schemas.microsoft.com/office/drawing/2014/main" id="{0A958154-89D9-64ED-1D25-FDD01538E651}"/>
+                  </a:ext>
+                </a:extLst>
+              </p:cNvPr>
+              <p:cNvSpPr txBox="1"/>
+              <p:nvPr/>
+            </p:nvSpPr>
+            <p:spPr>
+              <a:xfrm>
+                <a:off x="4060166" y="1230620"/>
+                <a:ext cx="1007999" cy="169277"/>
+              </a:xfrm>
+              <a:prstGeom prst="rect">
+                <a:avLst/>
+              </a:prstGeom>
+              <a:solidFill>
+                <a:srgbClr val="CF5C86">
+                  <a:alpha val="49804"/>
+                </a:srgbClr>
+              </a:solidFill>
+              <a:ln>
+                <a:noFill/>
+              </a:ln>
+            </p:spPr>
+            <p:txBody>
+              <a:bodyPr wrap="square" lIns="36000" rIns="36000" rtlCol="0">
+                <a:spAutoFit/>
+              </a:bodyPr>
+              <a:lstStyle/>
+              <a:p>
+                <a:pPr algn="ctr"/>
+                <a:r>
+                  <a:rPr lang="en-US" sz="500" i="1" dirty="0">
+                    <a:latin typeface="Arial" panose="020B0604020202020204" pitchFamily="34" charset="0"/>
+                    <a:cs typeface="Arial" panose="020B0604020202020204" pitchFamily="34" charset="0"/>
+                  </a:rPr>
+                  <a:t>EGFR</a:t>
+                </a:r>
+                <a:r>
+                  <a:rPr lang="en-US" sz="500" dirty="0">
+                    <a:latin typeface="Arial" panose="020B0604020202020204" pitchFamily="34" charset="0"/>
+                    <a:cs typeface="Arial" panose="020B0604020202020204" pitchFamily="34" charset="0"/>
+                  </a:rPr>
+                  <a:t> exon 19 deletion</a:t>
+                </a:r>
+              </a:p>
+            </p:txBody>
+          </p:sp>
+          <p:sp>
+            <p:nvSpPr>
+              <p:cNvPr id="11" name="TextBox 10">
+                <a:extLst>
+                  <a:ext uri="{FF2B5EF4-FFF2-40B4-BE49-F238E27FC236}">
+                    <a16:creationId xmlns:a16="http://schemas.microsoft.com/office/drawing/2014/main" id="{CB4250BE-9C57-45BE-1786-D1FE5FF820F9}"/>
+                  </a:ext>
+                </a:extLst>
+              </p:cNvPr>
+              <p:cNvSpPr txBox="1"/>
+              <p:nvPr/>
+            </p:nvSpPr>
+            <p:spPr>
+              <a:xfrm>
+                <a:off x="5392731" y="1230620"/>
+                <a:ext cx="1007999" cy="169277"/>
+              </a:xfrm>
+              <a:prstGeom prst="rect">
+                <a:avLst/>
+              </a:prstGeom>
+              <a:solidFill>
+                <a:srgbClr val="867DCE">
+                  <a:alpha val="50196"/>
+                </a:srgbClr>
+              </a:solidFill>
+            </p:spPr>
+            <p:txBody>
+              <a:bodyPr wrap="square" lIns="36000" rIns="36000" rtlCol="0">
+                <a:spAutoFit/>
+              </a:bodyPr>
+              <a:lstStyle/>
+              <a:p>
+                <a:pPr algn="ctr"/>
+                <a:r>
+                  <a:rPr lang="en-US" sz="500" dirty="0">
+                    <a:latin typeface="Arial" panose="020B0604020202020204" pitchFamily="34" charset="0"/>
+                    <a:cs typeface="Arial" panose="020B0604020202020204" pitchFamily="34" charset="0"/>
+                  </a:rPr>
+                  <a:t>Response to Dacomitinib*</a:t>
+                </a:r>
+              </a:p>
+            </p:txBody>
+          </p:sp>
+          <p:sp>
+            <p:nvSpPr>
+              <p:cNvPr id="12" name="TextBox 11">
+                <a:extLst>
+                  <a:ext uri="{FF2B5EF4-FFF2-40B4-BE49-F238E27FC236}">
+                    <a16:creationId xmlns:a16="http://schemas.microsoft.com/office/drawing/2014/main" id="{D0416FCA-63E8-0776-1540-D8DD552AA940}"/>
+                  </a:ext>
+                </a:extLst>
+              </p:cNvPr>
+              <p:cNvSpPr txBox="1"/>
+              <p:nvPr/>
+            </p:nvSpPr>
+            <p:spPr>
+              <a:xfrm>
+                <a:off x="5392730" y="1568086"/>
+                <a:ext cx="1007999" cy="169277"/>
+              </a:xfrm>
+              <a:prstGeom prst="rect">
+                <a:avLst/>
+              </a:prstGeom>
+              <a:solidFill>
+                <a:srgbClr val="867DCE">
+                  <a:alpha val="50196"/>
+                </a:srgbClr>
+              </a:solidFill>
+            </p:spPr>
+            <p:txBody>
+              <a:bodyPr wrap="square" lIns="36000" rIns="36000" rtlCol="0">
+                <a:spAutoFit/>
+              </a:bodyPr>
+              <a:lstStyle/>
+              <a:p>
+                <a:pPr algn="ctr"/>
+                <a:r>
+                  <a:rPr lang="en-US" sz="500" dirty="0">
+                    <a:latin typeface="Arial" panose="020B0604020202020204" pitchFamily="34" charset="0"/>
+                    <a:cs typeface="Arial" panose="020B0604020202020204" pitchFamily="34" charset="0"/>
+                  </a:rPr>
+                  <a:t>Response to Erlotinib*</a:t>
+                </a:r>
+              </a:p>
+            </p:txBody>
+          </p:sp>
+          <p:sp>
+            <p:nvSpPr>
+              <p:cNvPr id="13" name="TextBox 12">
+                <a:extLst>
+                  <a:ext uri="{FF2B5EF4-FFF2-40B4-BE49-F238E27FC236}">
+                    <a16:creationId xmlns:a16="http://schemas.microsoft.com/office/drawing/2014/main" id="{DAAF8117-CD47-8768-DC7C-A7CDFB7B4C28}"/>
+                  </a:ext>
+                </a:extLst>
+              </p:cNvPr>
+              <p:cNvSpPr txBox="1"/>
+              <p:nvPr/>
+            </p:nvSpPr>
+            <p:spPr>
+              <a:xfrm>
+                <a:off x="5392730" y="1905552"/>
+                <a:ext cx="1007999" cy="169277"/>
+              </a:xfrm>
+              <a:prstGeom prst="rect">
+                <a:avLst/>
+              </a:prstGeom>
+              <a:solidFill>
+                <a:srgbClr val="867DCE">
+                  <a:alpha val="50196"/>
+                </a:srgbClr>
+              </a:solidFill>
+            </p:spPr>
+            <p:txBody>
+              <a:bodyPr wrap="square" rtlCol="0">
+                <a:spAutoFit/>
+              </a:bodyPr>
+              <a:lstStyle/>
+              <a:p>
+                <a:pPr algn="ctr"/>
+                <a:r>
+                  <a:rPr lang="en-US" sz="500" dirty="0">
+                    <a:latin typeface="Arial" panose="020B0604020202020204" pitchFamily="34" charset="0"/>
+                    <a:cs typeface="Arial" panose="020B0604020202020204" pitchFamily="34" charset="0"/>
+                  </a:rPr>
+                  <a:t>Response to Osimertinib*</a:t>
+                </a:r>
+              </a:p>
+            </p:txBody>
+          </p:sp>
+          <p:sp>
+            <p:nvSpPr>
+              <p:cNvPr id="14" name="TextBox 13">
+                <a:extLst>
+                  <a:ext uri="{FF2B5EF4-FFF2-40B4-BE49-F238E27FC236}">
+                    <a16:creationId xmlns:a16="http://schemas.microsoft.com/office/drawing/2014/main" id="{BB9B28AA-0297-BEF1-74E5-5E89CDAFBAF2}"/>
+                  </a:ext>
+                </a:extLst>
+              </p:cNvPr>
+              <p:cNvSpPr txBox="1"/>
+              <p:nvPr/>
+            </p:nvSpPr>
+            <p:spPr>
+              <a:xfrm>
+                <a:off x="62470" y="1905552"/>
+                <a:ext cx="1007999" cy="169277"/>
+              </a:xfrm>
+              <a:prstGeom prst="rect">
+                <a:avLst/>
+              </a:prstGeom>
+              <a:solidFill>
+                <a:srgbClr val="F4B9BE">
+                  <a:alpha val="50000"/>
+                </a:srgbClr>
+              </a:solidFill>
+              <a:ln w="6350">
+                <a:noFill/>
+                <a:prstDash val="dash"/>
+              </a:ln>
+            </p:spPr>
+            <p:txBody>
+              <a:bodyPr wrap="square" lIns="36000" rIns="36000" rtlCol="0">
+                <a:spAutoFit/>
+              </a:bodyPr>
+              <a:lstStyle/>
+              <a:p>
+                <a:pPr algn="ctr"/>
+                <a:r>
+                  <a:rPr lang="en-US" sz="500" dirty="0">
+                    <a:latin typeface="Arial" panose="020B0604020202020204" pitchFamily="34" charset="0"/>
+                    <a:cs typeface="Arial" panose="020B0604020202020204" pitchFamily="34" charset="0"/>
+                  </a:rPr>
+                  <a:t>chr7:g.55174775_55174789del </a:t>
+                </a:r>
+              </a:p>
+            </p:txBody>
+          </p:sp>
+          <p:cxnSp>
+            <p:nvCxnSpPr>
+              <p:cNvPr id="18" name="Straight Arrow Connector 17">
+                <a:extLst>
+                  <a:ext uri="{FF2B5EF4-FFF2-40B4-BE49-F238E27FC236}">
+                    <a16:creationId xmlns:a16="http://schemas.microsoft.com/office/drawing/2014/main" id="{50031A52-D40A-5D7D-D75A-658F64957F17}"/>
+                  </a:ext>
+                </a:extLst>
+              </p:cNvPr>
+              <p:cNvCxnSpPr>
+                <a:cxnSpLocks/>
+                <a:stCxn id="2" idx="3"/>
+                <a:endCxn id="6" idx="1"/>
+              </p:cNvCxnSpPr>
+              <p:nvPr/>
+            </p:nvCxnSpPr>
+            <p:spPr>
+              <a:xfrm>
+                <a:off x="1070468" y="1315257"/>
+                <a:ext cx="324566" cy="0"/>
+              </a:xfrm>
+              <a:prstGeom prst="straightConnector1">
+                <a:avLst/>
+              </a:prstGeom>
+              <a:ln>
+                <a:solidFill>
+                  <a:srgbClr val="7D3C46">
+                    <a:alpha val="74902"/>
+                  </a:srgbClr>
+                </a:solidFill>
+                <a:tailEnd type="triangle"/>
+              </a:ln>
+            </p:spPr>
+            <p:style>
+              <a:lnRef idx="1">
+                <a:schemeClr val="dk1"/>
+              </a:lnRef>
+              <a:fillRef idx="0">
+                <a:schemeClr val="dk1"/>
+              </a:fillRef>
+              <a:effectRef idx="0">
+                <a:schemeClr val="dk1"/>
+              </a:effectRef>
+              <a:fontRef idx="minor">
+                <a:schemeClr val="tx1"/>
+              </a:fontRef>
+            </p:style>
+          </p:cxnSp>
+          <p:cxnSp>
+            <p:nvCxnSpPr>
+              <p:cNvPr id="20" name="Straight Arrow Connector 19">
+                <a:extLst>
+                  <a:ext uri="{FF2B5EF4-FFF2-40B4-BE49-F238E27FC236}">
+                    <a16:creationId xmlns:a16="http://schemas.microsoft.com/office/drawing/2014/main" id="{6B276836-0882-5A4A-D8BB-AE1B8169256C}"/>
+                  </a:ext>
+                </a:extLst>
+              </p:cNvPr>
+              <p:cNvCxnSpPr>
+                <a:cxnSpLocks/>
+                <a:stCxn id="5" idx="3"/>
+                <a:endCxn id="7" idx="1"/>
+              </p:cNvCxnSpPr>
+              <p:nvPr/>
+            </p:nvCxnSpPr>
+            <p:spPr>
+              <a:xfrm>
+                <a:off x="1070470" y="1652723"/>
+                <a:ext cx="324567" cy="0"/>
+              </a:xfrm>
+              <a:prstGeom prst="straightConnector1">
+                <a:avLst/>
+              </a:prstGeom>
+              <a:ln>
+                <a:solidFill>
+                  <a:srgbClr val="7D3C46">
+                    <a:alpha val="74902"/>
+                  </a:srgbClr>
+                </a:solidFill>
+                <a:tailEnd type="triangle"/>
+              </a:ln>
+            </p:spPr>
+            <p:style>
+              <a:lnRef idx="1">
+                <a:schemeClr val="dk1"/>
+              </a:lnRef>
+              <a:fillRef idx="0">
+                <a:schemeClr val="dk1"/>
+              </a:fillRef>
+              <a:effectRef idx="0">
+                <a:schemeClr val="dk1"/>
+              </a:effectRef>
+              <a:fontRef idx="minor">
+                <a:schemeClr val="tx1"/>
+              </a:fontRef>
+            </p:style>
+          </p:cxnSp>
+          <p:cxnSp>
+            <p:nvCxnSpPr>
+              <p:cNvPr id="22" name="Straight Arrow Connector 21">
+                <a:extLst>
+                  <a:ext uri="{FF2B5EF4-FFF2-40B4-BE49-F238E27FC236}">
+                    <a16:creationId xmlns:a16="http://schemas.microsoft.com/office/drawing/2014/main" id="{6574F2FB-7BB7-FE24-6B06-90C80B07D74A}"/>
+                  </a:ext>
+                </a:extLst>
+              </p:cNvPr>
+              <p:cNvCxnSpPr>
+                <a:stCxn id="6" idx="3"/>
+                <a:endCxn id="8" idx="1"/>
+              </p:cNvCxnSpPr>
+              <p:nvPr/>
+            </p:nvCxnSpPr>
+            <p:spPr>
+              <a:xfrm>
+                <a:off x="2403033" y="1315257"/>
+                <a:ext cx="324566" cy="0"/>
+              </a:xfrm>
+              <a:prstGeom prst="straightConnector1">
+                <a:avLst/>
+              </a:prstGeom>
+              <a:ln>
+                <a:solidFill>
+                  <a:srgbClr val="7D3C46">
+                    <a:alpha val="74902"/>
+                  </a:srgbClr>
+                </a:solidFill>
+                <a:tailEnd type="triangle"/>
+              </a:ln>
+            </p:spPr>
+            <p:style>
+              <a:lnRef idx="1">
+                <a:schemeClr val="dk1"/>
+              </a:lnRef>
+              <a:fillRef idx="0">
+                <a:schemeClr val="dk1"/>
+              </a:fillRef>
+              <a:effectRef idx="0">
+                <a:schemeClr val="dk1"/>
+              </a:effectRef>
+              <a:fontRef idx="minor">
+                <a:schemeClr val="tx1"/>
+              </a:fontRef>
+            </p:style>
+          </p:cxnSp>
+          <p:cxnSp>
+            <p:nvCxnSpPr>
+              <p:cNvPr id="24" name="Straight Arrow Connector 23">
+                <a:extLst>
+                  <a:ext uri="{FF2B5EF4-FFF2-40B4-BE49-F238E27FC236}">
+                    <a16:creationId xmlns:a16="http://schemas.microsoft.com/office/drawing/2014/main" id="{DB132889-9CA6-6E55-D684-3A2D6336C838}"/>
+                  </a:ext>
+                </a:extLst>
+              </p:cNvPr>
+              <p:cNvCxnSpPr>
+                <a:stCxn id="8" idx="3"/>
+                <a:endCxn id="10" idx="1"/>
+              </p:cNvCxnSpPr>
+              <p:nvPr/>
+            </p:nvCxnSpPr>
+            <p:spPr>
+              <a:xfrm>
+                <a:off x="3735598" y="1315257"/>
+                <a:ext cx="324566" cy="0"/>
+              </a:xfrm>
+              <a:prstGeom prst="straightConnector1">
+                <a:avLst/>
+              </a:prstGeom>
+              <a:ln>
+                <a:solidFill>
+                  <a:srgbClr val="7D3C46">
+                    <a:alpha val="74902"/>
+                  </a:srgbClr>
+                </a:solidFill>
+                <a:tailEnd type="triangle"/>
+              </a:ln>
+            </p:spPr>
+            <p:style>
+              <a:lnRef idx="1">
+                <a:schemeClr val="dk1"/>
+              </a:lnRef>
+              <a:fillRef idx="0">
+                <a:schemeClr val="dk1"/>
+              </a:fillRef>
+              <a:effectRef idx="0">
+                <a:schemeClr val="dk1"/>
+              </a:effectRef>
+              <a:fontRef idx="minor">
+                <a:schemeClr val="tx1"/>
+              </a:fontRef>
+            </p:style>
+          </p:cxnSp>
+          <p:cxnSp>
+            <p:nvCxnSpPr>
+              <p:cNvPr id="26" name="Straight Arrow Connector 25">
+                <a:extLst>
+                  <a:ext uri="{FF2B5EF4-FFF2-40B4-BE49-F238E27FC236}">
+                    <a16:creationId xmlns:a16="http://schemas.microsoft.com/office/drawing/2014/main" id="{5905B411-71EA-E5F5-12F2-88491E2B361B}"/>
+                  </a:ext>
+                </a:extLst>
+              </p:cNvPr>
+              <p:cNvCxnSpPr>
+                <a:cxnSpLocks/>
+                <a:stCxn id="10" idx="3"/>
+                <a:endCxn id="11" idx="1"/>
+              </p:cNvCxnSpPr>
+              <p:nvPr/>
+            </p:nvCxnSpPr>
+            <p:spPr>
+              <a:xfrm>
+                <a:off x="5068163" y="1315257"/>
+                <a:ext cx="324566" cy="0"/>
+              </a:xfrm>
+              <a:prstGeom prst="straightConnector1">
+                <a:avLst/>
+              </a:prstGeom>
+              <a:ln>
+                <a:solidFill>
+                  <a:srgbClr val="7D3C46">
+                    <a:alpha val="74902"/>
+                  </a:srgbClr>
+                </a:solidFill>
+                <a:tailEnd type="triangle"/>
+              </a:ln>
+            </p:spPr>
+            <p:style>
+              <a:lnRef idx="1">
+                <a:schemeClr val="dk1"/>
+              </a:lnRef>
+              <a:fillRef idx="0">
+                <a:schemeClr val="dk1"/>
+              </a:fillRef>
+              <a:effectRef idx="0">
+                <a:schemeClr val="dk1"/>
+              </a:effectRef>
+              <a:fontRef idx="minor">
+                <a:schemeClr val="tx1"/>
+              </a:fontRef>
+            </p:style>
+          </p:cxnSp>
+          <p:cxnSp>
+            <p:nvCxnSpPr>
+              <p:cNvPr id="36" name="Curved Connector 35">
+                <a:extLst>
+                  <a:ext uri="{FF2B5EF4-FFF2-40B4-BE49-F238E27FC236}">
+                    <a16:creationId xmlns:a16="http://schemas.microsoft.com/office/drawing/2014/main" id="{56CB475F-6E25-7A89-EC46-AD322B78064E}"/>
+                  </a:ext>
+                </a:extLst>
+              </p:cNvPr>
+              <p:cNvCxnSpPr>
+                <a:cxnSpLocks/>
+                <a:stCxn id="10" idx="3"/>
+                <a:endCxn id="12" idx="1"/>
+              </p:cNvCxnSpPr>
+              <p:nvPr/>
+            </p:nvCxnSpPr>
+            <p:spPr>
+              <a:xfrm>
+                <a:off x="5068165" y="1315257"/>
+                <a:ext cx="324565" cy="337466"/>
+              </a:xfrm>
+              <a:prstGeom prst="curvedConnector3">
+                <a:avLst/>
+              </a:prstGeom>
+              <a:ln>
+                <a:solidFill>
+                  <a:srgbClr val="7D3C46">
+                    <a:alpha val="74902"/>
+                  </a:srgbClr>
+                </a:solidFill>
+                <a:tailEnd type="triangle"/>
+              </a:ln>
+            </p:spPr>
+            <p:style>
+              <a:lnRef idx="1">
+                <a:schemeClr val="dk1"/>
+              </a:lnRef>
+              <a:fillRef idx="0">
+                <a:schemeClr val="dk1"/>
+              </a:fillRef>
+              <a:effectRef idx="0">
+                <a:schemeClr val="dk1"/>
+              </a:effectRef>
+              <a:fontRef idx="minor">
+                <a:schemeClr val="tx1"/>
+              </a:fontRef>
+            </p:style>
+          </p:cxnSp>
+          <p:cxnSp>
+            <p:nvCxnSpPr>
+              <p:cNvPr id="38" name="Curved Connector 37">
+                <a:extLst>
+                  <a:ext uri="{FF2B5EF4-FFF2-40B4-BE49-F238E27FC236}">
+                    <a16:creationId xmlns:a16="http://schemas.microsoft.com/office/drawing/2014/main" id="{8C4BD1FA-0EB2-F894-B650-D6B6887977F1}"/>
+                  </a:ext>
+                </a:extLst>
+              </p:cNvPr>
+              <p:cNvCxnSpPr>
+                <a:cxnSpLocks/>
+                <a:stCxn id="10" idx="3"/>
+                <a:endCxn id="13" idx="1"/>
+              </p:cNvCxnSpPr>
+              <p:nvPr/>
+            </p:nvCxnSpPr>
+            <p:spPr>
+              <a:xfrm>
+                <a:off x="5068165" y="1315257"/>
+                <a:ext cx="324565" cy="674932"/>
+              </a:xfrm>
+              <a:prstGeom prst="curvedConnector3">
+                <a:avLst/>
+              </a:prstGeom>
+              <a:ln>
+                <a:solidFill>
+                  <a:srgbClr val="7D3C46">
+                    <a:alpha val="74902"/>
+                  </a:srgbClr>
+                </a:solidFill>
+                <a:tailEnd type="triangle"/>
+              </a:ln>
+            </p:spPr>
+            <p:style>
+              <a:lnRef idx="1">
+                <a:schemeClr val="dk1"/>
+              </a:lnRef>
+              <a:fillRef idx="0">
+                <a:schemeClr val="dk1"/>
+              </a:fillRef>
+              <a:effectRef idx="0">
+                <a:schemeClr val="dk1"/>
+              </a:effectRef>
+              <a:fontRef idx="minor">
+                <a:schemeClr val="tx1"/>
+              </a:fontRef>
+            </p:style>
+          </p:cxnSp>
+          <p:sp>
+            <p:nvSpPr>
+              <p:cNvPr id="39" name="TextBox 38">
+                <a:extLst>
+                  <a:ext uri="{FF2B5EF4-FFF2-40B4-BE49-F238E27FC236}">
+                    <a16:creationId xmlns:a16="http://schemas.microsoft.com/office/drawing/2014/main" id="{41457D82-6642-A0B5-2232-313792B23C04}"/>
+                  </a:ext>
+                </a:extLst>
+              </p:cNvPr>
+              <p:cNvSpPr txBox="1"/>
+              <p:nvPr/>
+            </p:nvSpPr>
+            <p:spPr>
+              <a:xfrm>
+                <a:off x="1395035" y="1905551"/>
+                <a:ext cx="1007999" cy="169277"/>
+              </a:xfrm>
+              <a:prstGeom prst="rect">
+                <a:avLst/>
+              </a:prstGeom>
+              <a:solidFill>
+                <a:srgbClr val="F4B9BE">
+                  <a:alpha val="50000"/>
+                </a:srgbClr>
+              </a:solidFill>
+              <a:ln w="6350">
+                <a:noFill/>
+                <a:prstDash val="dash"/>
+              </a:ln>
+            </p:spPr>
+            <p:txBody>
+              <a:bodyPr wrap="square" lIns="36000" rIns="36000" rtlCol="0">
+                <a:spAutoFit/>
+              </a:bodyPr>
+              <a:lstStyle/>
+              <a:p>
+                <a:pPr algn="ctr"/>
+                <a:r>
+                  <a:rPr lang="en-US" sz="500" dirty="0">
+                    <a:latin typeface="Arial" panose="020B0604020202020204" pitchFamily="34" charset="0"/>
+                    <a:cs typeface="Arial" panose="020B0604020202020204" pitchFamily="34" charset="0"/>
+                  </a:rPr>
+                  <a:t>NM_005228.5:c.2240_2254del</a:t>
+                </a:r>
+              </a:p>
+            </p:txBody>
+          </p:sp>
+          <p:cxnSp>
+            <p:nvCxnSpPr>
+              <p:cNvPr id="44" name="Straight Arrow Connector 43">
+                <a:extLst>
+                  <a:ext uri="{FF2B5EF4-FFF2-40B4-BE49-F238E27FC236}">
+                    <a16:creationId xmlns:a16="http://schemas.microsoft.com/office/drawing/2014/main" id="{DE514F6A-3928-0558-CC02-4D606C790DD0}"/>
+                  </a:ext>
+                </a:extLst>
+              </p:cNvPr>
+              <p:cNvCxnSpPr>
+                <a:cxnSpLocks/>
+                <a:stCxn id="14" idx="3"/>
+                <a:endCxn id="39" idx="1"/>
+              </p:cNvCxnSpPr>
+              <p:nvPr/>
+            </p:nvCxnSpPr>
+            <p:spPr>
+              <a:xfrm flipV="1">
+                <a:off x="1070467" y="1990190"/>
+                <a:ext cx="324566" cy="1"/>
+              </a:xfrm>
+              <a:prstGeom prst="straightConnector1">
+                <a:avLst/>
+              </a:prstGeom>
+              <a:ln>
+                <a:solidFill>
+                  <a:srgbClr val="7D3C46">
+                    <a:alpha val="75000"/>
+                  </a:srgbClr>
+                </a:solidFill>
+                <a:tailEnd type="triangle"/>
+              </a:ln>
+            </p:spPr>
+            <p:style>
+              <a:lnRef idx="1">
+                <a:schemeClr val="dk1"/>
+              </a:lnRef>
+              <a:fillRef idx="0">
+                <a:schemeClr val="dk1"/>
+              </a:fillRef>
+              <a:effectRef idx="0">
+                <a:schemeClr val="dk1"/>
+              </a:effectRef>
+              <a:fontRef idx="minor">
+                <a:schemeClr val="tx1"/>
+              </a:fontRef>
+            </p:style>
+          </p:cxnSp>
+          <p:sp>
+            <p:nvSpPr>
+              <p:cNvPr id="54" name="TextBox 53">
+                <a:extLst>
+                  <a:ext uri="{FF2B5EF4-FFF2-40B4-BE49-F238E27FC236}">
+                    <a16:creationId xmlns:a16="http://schemas.microsoft.com/office/drawing/2014/main" id="{9C84E535-D658-5A31-612E-EE68B09A4513}"/>
+                  </a:ext>
+                </a:extLst>
+              </p:cNvPr>
+              <p:cNvSpPr txBox="1"/>
+              <p:nvPr/>
+            </p:nvSpPr>
+            <p:spPr>
+              <a:xfrm>
+                <a:off x="62470" y="2474216"/>
+                <a:ext cx="5005693" cy="184120"/>
+              </a:xfrm>
+              <a:prstGeom prst="rect">
+                <a:avLst/>
+              </a:prstGeom>
+              <a:noFill/>
+              <a:ln>
+                <a:noFill/>
+              </a:ln>
+            </p:spPr>
+            <p:txBody>
+              <a:bodyPr wrap="square" rtlCol="0">
+                <a:spAutoFit/>
+              </a:bodyPr>
+              <a:lstStyle/>
+              <a:p>
+                <a:pPr algn="ctr"/>
+                <a:r>
+                  <a:rPr lang="en-US" sz="600" dirty="0">
+                    <a:latin typeface="Arial" panose="020B0604020202020204" pitchFamily="34" charset="0"/>
+                    <a:cs typeface="Arial" panose="020B0604020202020204" pitchFamily="34" charset="0"/>
+                  </a:rPr>
+                  <a:t>Categorical due to:</a:t>
+                </a:r>
+              </a:p>
+            </p:txBody>
+          </p:sp>
+          <p:sp>
+            <p:nvSpPr>
+              <p:cNvPr id="55" name="TextBox 54">
+                <a:extLst>
+                  <a:ext uri="{FF2B5EF4-FFF2-40B4-BE49-F238E27FC236}">
+                    <a16:creationId xmlns:a16="http://schemas.microsoft.com/office/drawing/2014/main" id="{411A0F2A-AC68-719D-2D75-5A31795C7B80}"/>
+                  </a:ext>
+                </a:extLst>
+              </p:cNvPr>
+              <p:cNvSpPr txBox="1"/>
+              <p:nvPr/>
+            </p:nvSpPr>
+            <p:spPr>
+              <a:xfrm>
+                <a:off x="62470" y="2675508"/>
+                <a:ext cx="1007999" cy="369332"/>
+              </a:xfrm>
+              <a:prstGeom prst="rect">
+                <a:avLst/>
+              </a:prstGeom>
+              <a:solidFill>
+                <a:srgbClr val="B78A12">
+                  <a:alpha val="25098"/>
+                </a:srgbClr>
+              </a:solidFill>
+            </p:spPr>
+            <p:txBody>
+              <a:bodyPr wrap="square" rtlCol="0">
+                <a:spAutoFit/>
+              </a:bodyPr>
+              <a:lstStyle/>
+              <a:p>
+                <a:pPr algn="ctr"/>
+                <a:r>
+                  <a:rPr lang="en-US" sz="600" dirty="0">
+                    <a:latin typeface="Arial" panose="020B0604020202020204" pitchFamily="34" charset="0"/>
+                    <a:cs typeface="Arial" panose="020B0604020202020204" pitchFamily="34" charset="0"/>
+                  </a:rPr>
+                  <a:t>Reference assemblies, insertion and deletion normalization</a:t>
+                </a:r>
+              </a:p>
+            </p:txBody>
+          </p:sp>
+          <p:sp>
+            <p:nvSpPr>
+              <p:cNvPr id="56" name="TextBox 55">
+                <a:extLst>
+                  <a:ext uri="{FF2B5EF4-FFF2-40B4-BE49-F238E27FC236}">
+                    <a16:creationId xmlns:a16="http://schemas.microsoft.com/office/drawing/2014/main" id="{808F9A0D-A939-6255-584C-60857390E4C5}"/>
+                  </a:ext>
+                </a:extLst>
+              </p:cNvPr>
+              <p:cNvSpPr txBox="1"/>
+              <p:nvPr/>
+            </p:nvSpPr>
+            <p:spPr>
+              <a:xfrm>
+                <a:off x="1395034" y="2675508"/>
+                <a:ext cx="1007999" cy="184666"/>
+              </a:xfrm>
+              <a:prstGeom prst="rect">
+                <a:avLst/>
+              </a:prstGeom>
+              <a:solidFill>
+                <a:srgbClr val="B78A12">
+                  <a:alpha val="25098"/>
+                </a:srgbClr>
+              </a:solidFill>
+            </p:spPr>
+            <p:txBody>
+              <a:bodyPr wrap="square" rtlCol="0">
+                <a:spAutoFit/>
+              </a:bodyPr>
+              <a:lstStyle/>
+              <a:p>
+                <a:pPr algn="ctr"/>
+                <a:r>
+                  <a:rPr lang="en-US" sz="600" dirty="0">
+                    <a:latin typeface="Arial" panose="020B0604020202020204" pitchFamily="34" charset="0"/>
+                    <a:cs typeface="Arial" panose="020B0604020202020204" pitchFamily="34" charset="0"/>
+                  </a:rPr>
+                  <a:t>Transcript choice</a:t>
+                </a:r>
+              </a:p>
+            </p:txBody>
+          </p:sp>
+          <p:sp>
+            <p:nvSpPr>
+              <p:cNvPr id="57" name="TextBox 56">
+                <a:extLst>
+                  <a:ext uri="{FF2B5EF4-FFF2-40B4-BE49-F238E27FC236}">
+                    <a16:creationId xmlns:a16="http://schemas.microsoft.com/office/drawing/2014/main" id="{CCCEE550-E9A4-2A61-F397-42257BCD24BF}"/>
+                  </a:ext>
+                </a:extLst>
+              </p:cNvPr>
+              <p:cNvSpPr txBox="1"/>
+              <p:nvPr/>
+            </p:nvSpPr>
+            <p:spPr>
+              <a:xfrm>
+                <a:off x="2727598" y="2675507"/>
+                <a:ext cx="1007999" cy="369332"/>
+              </a:xfrm>
+              <a:prstGeom prst="rect">
+                <a:avLst/>
+              </a:prstGeom>
+              <a:solidFill>
+                <a:srgbClr val="B78A12">
+                  <a:alpha val="25098"/>
+                </a:srgbClr>
+              </a:solidFill>
+            </p:spPr>
+            <p:txBody>
+              <a:bodyPr wrap="square" rtlCol="0">
+                <a:spAutoFit/>
+              </a:bodyPr>
+              <a:lstStyle/>
+              <a:p>
+                <a:pPr algn="ctr"/>
+                <a:r>
+                  <a:rPr lang="en-US" sz="600" dirty="0">
+                    <a:latin typeface="Arial" panose="020B0604020202020204" pitchFamily="34" charset="0"/>
+                    <a:cs typeface="Arial" panose="020B0604020202020204" pitchFamily="34" charset="0"/>
+                  </a:rPr>
+                  <a:t>Codon degeneracy, protein isoforms, frameshift normalization</a:t>
+                </a:r>
+              </a:p>
+            </p:txBody>
+          </p:sp>
+          <p:sp>
+            <p:nvSpPr>
+              <p:cNvPr id="58" name="TextBox 57">
+                <a:extLst>
+                  <a:ext uri="{FF2B5EF4-FFF2-40B4-BE49-F238E27FC236}">
+                    <a16:creationId xmlns:a16="http://schemas.microsoft.com/office/drawing/2014/main" id="{F6C6F662-FAAE-8DA4-727E-1A67CE46FAE0}"/>
+                  </a:ext>
+                </a:extLst>
+              </p:cNvPr>
+              <p:cNvSpPr txBox="1"/>
+              <p:nvPr/>
+            </p:nvSpPr>
+            <p:spPr>
+              <a:xfrm>
+                <a:off x="4060165" y="1857752"/>
+                <a:ext cx="1007999" cy="553998"/>
+              </a:xfrm>
+              <a:prstGeom prst="rect">
+                <a:avLst/>
+              </a:prstGeom>
+              <a:solidFill>
+                <a:srgbClr val="B78A12">
+                  <a:alpha val="25098"/>
+                </a:srgbClr>
+              </a:solidFill>
+            </p:spPr>
+            <p:txBody>
+              <a:bodyPr wrap="square" rtlCol="0">
+                <a:spAutoFit/>
+              </a:bodyPr>
+              <a:lstStyle/>
+              <a:p>
+                <a:pPr algn="ctr"/>
+                <a:r>
+                  <a:rPr lang="en-US" sz="600" dirty="0">
+                    <a:latin typeface="Arial" panose="020B0604020202020204" pitchFamily="34" charset="0"/>
+                    <a:cs typeface="Arial" panose="020B0604020202020204" pitchFamily="34" charset="0"/>
+                  </a:rPr>
+                  <a:t>Describes a discrete class of possible variation in the abstract, often representing sets of assayable alterations</a:t>
+                </a:r>
+              </a:p>
+            </p:txBody>
+          </p:sp>
+          <p:sp>
+            <p:nvSpPr>
+              <p:cNvPr id="59" name="TextBox 58">
+                <a:extLst>
+                  <a:ext uri="{FF2B5EF4-FFF2-40B4-BE49-F238E27FC236}">
+                    <a16:creationId xmlns:a16="http://schemas.microsoft.com/office/drawing/2014/main" id="{73E8C355-2A34-9C9D-E382-E75BE2185170}"/>
+                  </a:ext>
+                </a:extLst>
+              </p:cNvPr>
+              <p:cNvSpPr txBox="1"/>
+              <p:nvPr/>
+            </p:nvSpPr>
+            <p:spPr>
+              <a:xfrm>
+                <a:off x="5392730" y="1053647"/>
+                <a:ext cx="1007999" cy="184666"/>
+              </a:xfrm>
+              <a:prstGeom prst="rect">
+                <a:avLst/>
+              </a:prstGeom>
+              <a:noFill/>
+            </p:spPr>
+            <p:txBody>
+              <a:bodyPr wrap="square" rtlCol="0">
+                <a:spAutoFit/>
+              </a:bodyPr>
+              <a:lstStyle/>
+              <a:p>
+                <a:pPr algn="ctr"/>
+                <a:r>
+                  <a:rPr lang="en-US" sz="600" dirty="0">
+                    <a:latin typeface="Arial" panose="020B0604020202020204" pitchFamily="34" charset="0"/>
+                    <a:cs typeface="Arial" panose="020B0604020202020204" pitchFamily="34" charset="0"/>
+                  </a:rPr>
+                  <a:t>Genomic knowledge</a:t>
+                </a:r>
+              </a:p>
+            </p:txBody>
+          </p:sp>
+          <p:sp>
+            <p:nvSpPr>
+              <p:cNvPr id="61" name="TextBox 60">
+                <a:extLst>
+                  <a:ext uri="{FF2B5EF4-FFF2-40B4-BE49-F238E27FC236}">
+                    <a16:creationId xmlns:a16="http://schemas.microsoft.com/office/drawing/2014/main" id="{00EDC3DA-C94E-6EBD-8EF1-AC6EF4D0F982}"/>
+                  </a:ext>
+                </a:extLst>
+              </p:cNvPr>
+              <p:cNvSpPr txBox="1"/>
+              <p:nvPr/>
+            </p:nvSpPr>
+            <p:spPr>
+              <a:xfrm>
+                <a:off x="2727597" y="1049071"/>
+                <a:ext cx="1007999" cy="184666"/>
+              </a:xfrm>
+              <a:prstGeom prst="rect">
+                <a:avLst/>
+              </a:prstGeom>
+              <a:noFill/>
+            </p:spPr>
+            <p:txBody>
+              <a:bodyPr wrap="square" rtlCol="0">
+                <a:spAutoFit/>
+              </a:bodyPr>
+              <a:lstStyle/>
+              <a:p>
+                <a:pPr algn="ctr"/>
+                <a:r>
+                  <a:rPr lang="en-US" sz="600" dirty="0">
+                    <a:latin typeface="Arial" panose="020B0604020202020204" pitchFamily="34" charset="0"/>
+                    <a:cs typeface="Arial" panose="020B0604020202020204" pitchFamily="34" charset="0"/>
+                  </a:rPr>
+                  <a:t>HGVS Protein (p.)</a:t>
+                </a:r>
+              </a:p>
+            </p:txBody>
+          </p:sp>
+          <p:sp>
+            <p:nvSpPr>
+              <p:cNvPr id="62" name="TextBox 61">
+                <a:extLst>
+                  <a:ext uri="{FF2B5EF4-FFF2-40B4-BE49-F238E27FC236}">
+                    <a16:creationId xmlns:a16="http://schemas.microsoft.com/office/drawing/2014/main" id="{E8610847-0CDF-17F6-4E61-829170FB622C}"/>
+                  </a:ext>
+                </a:extLst>
+              </p:cNvPr>
+              <p:cNvSpPr txBox="1"/>
+              <p:nvPr/>
+            </p:nvSpPr>
+            <p:spPr>
+              <a:xfrm>
+                <a:off x="1395031" y="1053103"/>
+                <a:ext cx="1007999" cy="184666"/>
+              </a:xfrm>
+              <a:prstGeom prst="rect">
+                <a:avLst/>
+              </a:prstGeom>
+              <a:noFill/>
+            </p:spPr>
+            <p:txBody>
+              <a:bodyPr wrap="square" rtlCol="0">
+                <a:spAutoFit/>
+              </a:bodyPr>
+              <a:lstStyle/>
+              <a:p>
+                <a:pPr algn="ctr"/>
+                <a:r>
+                  <a:rPr lang="en-US" sz="600" dirty="0">
+                    <a:latin typeface="Arial" panose="020B0604020202020204" pitchFamily="34" charset="0"/>
+                    <a:cs typeface="Arial" panose="020B0604020202020204" pitchFamily="34" charset="0"/>
+                  </a:rPr>
+                  <a:t>HGVS Coding DNA (c.)</a:t>
+                </a:r>
+              </a:p>
+            </p:txBody>
+          </p:sp>
+          <p:sp>
+            <p:nvSpPr>
+              <p:cNvPr id="63" name="TextBox 62">
+                <a:extLst>
+                  <a:ext uri="{FF2B5EF4-FFF2-40B4-BE49-F238E27FC236}">
+                    <a16:creationId xmlns:a16="http://schemas.microsoft.com/office/drawing/2014/main" id="{F5D67200-6ECC-83F4-0B3F-27ABC48B7C79}"/>
+                  </a:ext>
+                </a:extLst>
+              </p:cNvPr>
+              <p:cNvSpPr txBox="1"/>
+              <p:nvPr/>
+            </p:nvSpPr>
+            <p:spPr>
+              <a:xfrm>
+                <a:off x="62464" y="1049071"/>
+                <a:ext cx="1007999" cy="184666"/>
+              </a:xfrm>
+              <a:prstGeom prst="rect">
+                <a:avLst/>
+              </a:prstGeom>
+              <a:noFill/>
+            </p:spPr>
+            <p:txBody>
+              <a:bodyPr wrap="square" rtlCol="0">
+                <a:spAutoFit/>
+              </a:bodyPr>
+              <a:lstStyle/>
+              <a:p>
+                <a:pPr algn="ctr"/>
+                <a:r>
+                  <a:rPr lang="en-US" sz="600" dirty="0">
+                    <a:latin typeface="Arial" panose="020B0604020202020204" pitchFamily="34" charset="0"/>
+                    <a:cs typeface="Arial" panose="020B0604020202020204" pitchFamily="34" charset="0"/>
+                  </a:rPr>
+                  <a:t>HGVS Genomic (g.)</a:t>
+                </a:r>
+              </a:p>
+            </p:txBody>
+          </p:sp>
+          <p:sp>
+            <p:nvSpPr>
+              <p:cNvPr id="65" name="TextBox 64">
+                <a:extLst>
+                  <a:ext uri="{FF2B5EF4-FFF2-40B4-BE49-F238E27FC236}">
+                    <a16:creationId xmlns:a16="http://schemas.microsoft.com/office/drawing/2014/main" id="{1414C298-01A0-C2CB-D4A2-2E033913A840}"/>
+                  </a:ext>
+                </a:extLst>
+              </p:cNvPr>
+              <p:cNvSpPr txBox="1"/>
+              <p:nvPr/>
+            </p:nvSpPr>
+            <p:spPr>
+              <a:xfrm>
+                <a:off x="1417639" y="828129"/>
+                <a:ext cx="3627917" cy="200055"/>
+              </a:xfrm>
+              <a:prstGeom prst="rect">
+                <a:avLst/>
+              </a:prstGeom>
+              <a:noFill/>
+            </p:spPr>
+            <p:txBody>
+              <a:bodyPr wrap="none" rtlCol="0">
+                <a:spAutoFit/>
+              </a:bodyPr>
+              <a:lstStyle/>
+              <a:p>
+                <a:pPr algn="ctr"/>
+                <a:r>
+                  <a:rPr lang="en-US" sz="700" dirty="0">
+                    <a:latin typeface="Arial" panose="020B0604020202020204" pitchFamily="34" charset="0"/>
+                    <a:cs typeface="Arial" panose="020B0604020202020204" pitchFamily="34" charset="0"/>
+                  </a:rPr>
+                  <a:t>Both specific and broadly defined sets of genomic alterations are inherently categorical</a:t>
+                </a:r>
+              </a:p>
+            </p:txBody>
+          </p:sp>
+          <p:sp>
+            <p:nvSpPr>
+              <p:cNvPr id="3" name="TextBox 2">
+                <a:extLst>
+                  <a:ext uri="{FF2B5EF4-FFF2-40B4-BE49-F238E27FC236}">
+                    <a16:creationId xmlns:a16="http://schemas.microsoft.com/office/drawing/2014/main" id="{14C7CB68-3295-22A7-72AC-ACB390377782}"/>
+                  </a:ext>
+                </a:extLst>
+              </p:cNvPr>
+              <p:cNvSpPr txBox="1"/>
+              <p:nvPr/>
+            </p:nvSpPr>
+            <p:spPr>
+              <a:xfrm>
+                <a:off x="5392730" y="2242475"/>
+                <a:ext cx="1007999" cy="169277"/>
+              </a:xfrm>
+              <a:prstGeom prst="rect">
+                <a:avLst/>
+              </a:prstGeom>
+              <a:solidFill>
+                <a:srgbClr val="867DCE">
+                  <a:alpha val="50196"/>
+                </a:srgbClr>
+              </a:solidFill>
+            </p:spPr>
+            <p:txBody>
+              <a:bodyPr wrap="square" rtlCol="0">
+                <a:spAutoFit/>
+              </a:bodyPr>
+              <a:lstStyle/>
+              <a:p>
+                <a:pPr algn="ctr"/>
+                <a:r>
+                  <a:rPr lang="en-US" sz="500" dirty="0">
+                    <a:latin typeface="Arial" panose="020B0604020202020204" pitchFamily="34" charset="0"/>
+                    <a:cs typeface="Arial" panose="020B0604020202020204" pitchFamily="34" charset="0"/>
+                  </a:rPr>
+                  <a:t>Response to Osimertinib*</a:t>
+                </a:r>
+              </a:p>
+            </p:txBody>
+          </p:sp>
+          <p:sp>
+            <p:nvSpPr>
+              <p:cNvPr id="4" name="TextBox 3">
+                <a:extLst>
+                  <a:ext uri="{FF2B5EF4-FFF2-40B4-BE49-F238E27FC236}">
+                    <a16:creationId xmlns:a16="http://schemas.microsoft.com/office/drawing/2014/main" id="{D4814D26-B3CB-51D3-70BD-24A1322EEBC9}"/>
+                  </a:ext>
+                </a:extLst>
+              </p:cNvPr>
+              <p:cNvSpPr txBox="1"/>
+              <p:nvPr/>
+            </p:nvSpPr>
+            <p:spPr>
+              <a:xfrm>
+                <a:off x="62470" y="2242475"/>
+                <a:ext cx="1007999" cy="169277"/>
+              </a:xfrm>
+              <a:prstGeom prst="rect">
+                <a:avLst/>
+              </a:prstGeom>
+              <a:solidFill>
+                <a:srgbClr val="F4B9BE">
+                  <a:alpha val="50000"/>
+                </a:srgbClr>
+              </a:solidFill>
+              <a:ln w="6350">
+                <a:noFill/>
+                <a:prstDash val="dash"/>
+              </a:ln>
+            </p:spPr>
+            <p:txBody>
+              <a:bodyPr wrap="square" lIns="36000" rIns="36000" rtlCol="0">
+                <a:spAutoFit/>
+              </a:bodyPr>
+              <a:lstStyle/>
+              <a:p>
+                <a:pPr algn="ctr"/>
+                <a:r>
+                  <a:rPr lang="en-US" sz="500" dirty="0">
+                    <a:latin typeface="Arial" panose="020B0604020202020204" pitchFamily="34" charset="0"/>
+                    <a:cs typeface="Arial" panose="020B0604020202020204" pitchFamily="34" charset="0"/>
+                  </a:rPr>
+                  <a:t>chr7:g.55174777_55174791del </a:t>
+                </a:r>
+              </a:p>
+            </p:txBody>
+          </p:sp>
+          <p:sp>
+            <p:nvSpPr>
+              <p:cNvPr id="15" name="TextBox 14">
+                <a:extLst>
+                  <a:ext uri="{FF2B5EF4-FFF2-40B4-BE49-F238E27FC236}">
+                    <a16:creationId xmlns:a16="http://schemas.microsoft.com/office/drawing/2014/main" id="{03B5E9D5-D1FD-95E7-CEA3-E2D6134AED2F}"/>
+                  </a:ext>
+                </a:extLst>
+              </p:cNvPr>
+              <p:cNvSpPr txBox="1"/>
+              <p:nvPr/>
+            </p:nvSpPr>
+            <p:spPr>
+              <a:xfrm rot="18936829">
+                <a:off x="1059556" y="2161356"/>
+                <a:ext cx="491393" cy="169277"/>
+              </a:xfrm>
+              <a:prstGeom prst="rect">
+                <a:avLst/>
+              </a:prstGeom>
+              <a:noFill/>
+              <a:ln w="6350">
+                <a:noFill/>
+                <a:prstDash val="dash"/>
+              </a:ln>
+            </p:spPr>
+            <p:txBody>
+              <a:bodyPr wrap="square" lIns="36000" rIns="36000" rtlCol="0">
+                <a:spAutoFit/>
+              </a:bodyPr>
+              <a:lstStyle/>
+              <a:p>
+                <a:pPr algn="ctr"/>
+                <a:r>
+                  <a:rPr lang="en-US" sz="500" dirty="0">
+                    <a:latin typeface="Arial" panose="020B0604020202020204" pitchFamily="34" charset="0"/>
+                    <a:cs typeface="Arial" panose="020B0604020202020204" pitchFamily="34" charset="0"/>
+                  </a:rPr>
+                  <a:t>Transcribes to</a:t>
+                </a:r>
+              </a:p>
+            </p:txBody>
+          </p:sp>
+          <p:sp>
+            <p:nvSpPr>
+              <p:cNvPr id="60" name="Rectangle 59">
+                <a:extLst>
+                  <a:ext uri="{FF2B5EF4-FFF2-40B4-BE49-F238E27FC236}">
+                    <a16:creationId xmlns:a16="http://schemas.microsoft.com/office/drawing/2014/main" id="{4C280B47-F110-A16B-FBF1-A6849F249061}"/>
+                  </a:ext>
+                </a:extLst>
+              </p:cNvPr>
+              <p:cNvSpPr/>
+              <p:nvPr/>
+            </p:nvSpPr>
+            <p:spPr>
+              <a:xfrm>
+                <a:off x="3982732" y="1230618"/>
+                <a:ext cx="77426" cy="169200"/>
+              </a:xfrm>
+              <a:prstGeom prst="rect">
+                <a:avLst/>
+              </a:prstGeom>
+              <a:noFill/>
+              <a:ln>
+                <a:noFill/>
+              </a:ln>
+            </p:spPr>
+            <p:style>
+              <a:lnRef idx="2">
+                <a:schemeClr val="accent6"/>
+              </a:lnRef>
+              <a:fillRef idx="1">
+                <a:schemeClr val="lt1"/>
+              </a:fillRef>
+              <a:effectRef idx="0">
+                <a:schemeClr val="accent6"/>
+              </a:effectRef>
+              <a:fontRef idx="minor">
+                <a:schemeClr val="dk1"/>
+              </a:fontRef>
+            </p:style>
+            <p:txBody>
+              <a:bodyPr rtlCol="0" anchor="ctr"/>
+              <a:lstStyle/>
+              <a:p>
+                <a:pPr algn="ctr"/>
+                <a:endParaRPr lang="en-US"/>
+              </a:p>
+            </p:txBody>
+          </p:sp>
+          <p:sp>
+            <p:nvSpPr>
+              <p:cNvPr id="64" name="Rectangle 63">
+                <a:extLst>
+                  <a:ext uri="{FF2B5EF4-FFF2-40B4-BE49-F238E27FC236}">
+                    <a16:creationId xmlns:a16="http://schemas.microsoft.com/office/drawing/2014/main" id="{8B92D35A-E36C-A999-6FEB-8A78245AAFE0}"/>
+                  </a:ext>
+                </a:extLst>
+              </p:cNvPr>
+              <p:cNvSpPr/>
+              <p:nvPr/>
+            </p:nvSpPr>
+            <p:spPr>
+              <a:xfrm>
+                <a:off x="2645613" y="1568084"/>
+                <a:ext cx="77426" cy="169200"/>
+              </a:xfrm>
+              <a:prstGeom prst="rect">
+                <a:avLst/>
+              </a:prstGeom>
+              <a:noFill/>
+              <a:ln>
+                <a:noFill/>
+              </a:ln>
+            </p:spPr>
+            <p:style>
+              <a:lnRef idx="2">
+                <a:schemeClr val="accent6"/>
+              </a:lnRef>
+              <a:fillRef idx="1">
+                <a:schemeClr val="lt1"/>
+              </a:fillRef>
+              <a:effectRef idx="0">
+                <a:schemeClr val="accent6"/>
+              </a:effectRef>
+              <a:fontRef idx="minor">
+                <a:schemeClr val="dk1"/>
+              </a:fontRef>
+            </p:style>
+            <p:txBody>
+              <a:bodyPr rtlCol="0" anchor="ctr"/>
+              <a:lstStyle/>
+              <a:p>
+                <a:pPr algn="ctr"/>
+                <a:endParaRPr lang="en-US"/>
+              </a:p>
+            </p:txBody>
+          </p:sp>
+          <p:cxnSp>
+            <p:nvCxnSpPr>
+              <p:cNvPr id="68" name="Curved Connector 67">
+                <a:extLst>
+                  <a:ext uri="{FF2B5EF4-FFF2-40B4-BE49-F238E27FC236}">
+                    <a16:creationId xmlns:a16="http://schemas.microsoft.com/office/drawing/2014/main" id="{AF92620E-DAAE-043A-4F03-43F19F6DB9C6}"/>
+                  </a:ext>
+                </a:extLst>
+              </p:cNvPr>
+              <p:cNvCxnSpPr>
+                <a:cxnSpLocks/>
+                <a:stCxn id="4" idx="3"/>
+              </p:cNvCxnSpPr>
+              <p:nvPr/>
+            </p:nvCxnSpPr>
+            <p:spPr>
+              <a:xfrm flipV="1">
+                <a:off x="1070467" y="1990151"/>
+                <a:ext cx="247136" cy="336963"/>
+              </a:xfrm>
+              <a:prstGeom prst="curvedConnector3">
+                <a:avLst/>
+              </a:prstGeom>
+              <a:ln>
+                <a:solidFill>
+                  <a:srgbClr val="7D3C46">
+                    <a:alpha val="75000"/>
+                  </a:srgbClr>
+                </a:solidFill>
+              </a:ln>
+            </p:spPr>
+            <p:style>
+              <a:lnRef idx="1">
+                <a:schemeClr val="dk1"/>
+              </a:lnRef>
+              <a:fillRef idx="0">
+                <a:schemeClr val="dk1"/>
+              </a:fillRef>
+              <a:effectRef idx="0">
+                <a:schemeClr val="dk1"/>
+              </a:effectRef>
+              <a:fontRef idx="minor">
+                <a:schemeClr val="tx1"/>
+              </a:fontRef>
+            </p:style>
+          </p:cxnSp>
+          <p:cxnSp>
+            <p:nvCxnSpPr>
+              <p:cNvPr id="70" name="Curved Connector 69">
+                <a:extLst>
+                  <a:ext uri="{FF2B5EF4-FFF2-40B4-BE49-F238E27FC236}">
+                    <a16:creationId xmlns:a16="http://schemas.microsoft.com/office/drawing/2014/main" id="{1AC2272F-1211-94E7-8220-B83078CC09A8}"/>
+                  </a:ext>
+                </a:extLst>
+              </p:cNvPr>
+              <p:cNvCxnSpPr>
+                <a:cxnSpLocks/>
+                <a:stCxn id="7" idx="3"/>
+              </p:cNvCxnSpPr>
+              <p:nvPr/>
+            </p:nvCxnSpPr>
+            <p:spPr>
+              <a:xfrm flipV="1">
+                <a:off x="2403034" y="1315220"/>
+                <a:ext cx="247134" cy="337505"/>
+              </a:xfrm>
+              <a:prstGeom prst="curvedConnector3">
+                <a:avLst/>
+              </a:prstGeom>
+              <a:ln>
+                <a:solidFill>
+                  <a:srgbClr val="7D3C46">
+                    <a:alpha val="75000"/>
+                  </a:srgbClr>
+                </a:solidFill>
+              </a:ln>
+            </p:spPr>
+            <p:style>
+              <a:lnRef idx="1">
+                <a:schemeClr val="dk1"/>
+              </a:lnRef>
+              <a:fillRef idx="0">
+                <a:schemeClr val="dk1"/>
+              </a:fillRef>
+              <a:effectRef idx="0">
+                <a:schemeClr val="dk1"/>
+              </a:effectRef>
+              <a:fontRef idx="minor">
+                <a:schemeClr val="tx1"/>
+              </a:fontRef>
+            </p:style>
+          </p:cxnSp>
+          <p:cxnSp>
+            <p:nvCxnSpPr>
+              <p:cNvPr id="72" name="Curved Connector 71">
+                <a:extLst>
+                  <a:ext uri="{FF2B5EF4-FFF2-40B4-BE49-F238E27FC236}">
+                    <a16:creationId xmlns:a16="http://schemas.microsoft.com/office/drawing/2014/main" id="{9D6C1DD4-5F03-5B59-0C67-BE4CA4B1F950}"/>
+                  </a:ext>
+                </a:extLst>
+              </p:cNvPr>
+              <p:cNvCxnSpPr>
+                <a:cxnSpLocks/>
+                <a:stCxn id="39" idx="3"/>
+                <a:endCxn id="64" idx="1"/>
+              </p:cNvCxnSpPr>
+              <p:nvPr/>
+            </p:nvCxnSpPr>
+            <p:spPr>
+              <a:xfrm flipV="1">
+                <a:off x="2403034" y="1652684"/>
+                <a:ext cx="242581" cy="337504"/>
+              </a:xfrm>
+              <a:prstGeom prst="curvedConnector3">
+                <a:avLst/>
+              </a:prstGeom>
+              <a:ln>
+                <a:solidFill>
+                  <a:srgbClr val="7D3C46">
+                    <a:alpha val="75000"/>
+                  </a:srgbClr>
+                </a:solidFill>
+              </a:ln>
+            </p:spPr>
+            <p:style>
+              <a:lnRef idx="1">
+                <a:schemeClr val="dk1"/>
+              </a:lnRef>
+              <a:fillRef idx="0">
+                <a:schemeClr val="dk1"/>
+              </a:fillRef>
+              <a:effectRef idx="0">
+                <a:schemeClr val="dk1"/>
+              </a:effectRef>
+              <a:fontRef idx="minor">
+                <a:schemeClr val="tx1"/>
+              </a:fontRef>
+            </p:style>
+          </p:cxnSp>
+          <p:cxnSp>
+            <p:nvCxnSpPr>
+              <p:cNvPr id="76" name="Curved Connector 75">
+                <a:extLst>
+                  <a:ext uri="{FF2B5EF4-FFF2-40B4-BE49-F238E27FC236}">
+                    <a16:creationId xmlns:a16="http://schemas.microsoft.com/office/drawing/2014/main" id="{039CD442-36D9-E8F4-1240-6D20CB596C61}"/>
+                  </a:ext>
+                </a:extLst>
+              </p:cNvPr>
+              <p:cNvCxnSpPr>
+                <a:stCxn id="9" idx="3"/>
+                <a:endCxn id="60" idx="1"/>
+              </p:cNvCxnSpPr>
+              <p:nvPr/>
+            </p:nvCxnSpPr>
+            <p:spPr>
+              <a:xfrm flipV="1">
+                <a:off x="3735596" y="1315220"/>
+                <a:ext cx="247136" cy="337505"/>
+              </a:xfrm>
+              <a:prstGeom prst="curvedConnector3">
+                <a:avLst/>
+              </a:prstGeom>
+              <a:ln>
+                <a:solidFill>
+                  <a:srgbClr val="7D3C46">
+                    <a:alpha val="75000"/>
+                  </a:srgbClr>
+                </a:solidFill>
+              </a:ln>
+            </p:spPr>
+            <p:style>
+              <a:lnRef idx="1">
+                <a:schemeClr val="accent1"/>
+              </a:lnRef>
+              <a:fillRef idx="0">
+                <a:schemeClr val="accent1"/>
+              </a:fillRef>
+              <a:effectRef idx="0">
+                <a:schemeClr val="accent1"/>
+              </a:effectRef>
+              <a:fontRef idx="minor">
+                <a:schemeClr val="tx1"/>
+              </a:fontRef>
+            </p:style>
+          </p:cxnSp>
+          <p:cxnSp>
+            <p:nvCxnSpPr>
+              <p:cNvPr id="78" name="Straight Arrow Connector 77">
+                <a:extLst>
+                  <a:ext uri="{FF2B5EF4-FFF2-40B4-BE49-F238E27FC236}">
+                    <a16:creationId xmlns:a16="http://schemas.microsoft.com/office/drawing/2014/main" id="{40568288-5F55-E9B8-2FAC-B22BB88C4CED}"/>
+                  </a:ext>
+                </a:extLst>
+              </p:cNvPr>
+              <p:cNvCxnSpPr>
+                <a:stCxn id="64" idx="1"/>
+                <a:endCxn id="9" idx="1"/>
+              </p:cNvCxnSpPr>
+              <p:nvPr/>
+            </p:nvCxnSpPr>
+            <p:spPr>
+              <a:xfrm>
+                <a:off x="2645613" y="1652686"/>
+                <a:ext cx="81984" cy="39"/>
+              </a:xfrm>
+              <a:prstGeom prst="straightConnector1">
+                <a:avLst/>
+              </a:prstGeom>
+              <a:ln>
+                <a:solidFill>
+                  <a:srgbClr val="7D3C46">
+                    <a:alpha val="75000"/>
+                  </a:srgbClr>
+                </a:solidFill>
+                <a:tailEnd type="triangle"/>
+              </a:ln>
+            </p:spPr>
+            <p:style>
+              <a:lnRef idx="1">
+                <a:schemeClr val="accent1"/>
+              </a:lnRef>
+              <a:fillRef idx="0">
+                <a:schemeClr val="accent1"/>
+              </a:fillRef>
+              <a:effectRef idx="0">
+                <a:schemeClr val="accent1"/>
+              </a:effectRef>
+              <a:fontRef idx="minor">
+                <a:schemeClr val="tx1"/>
+              </a:fontRef>
+            </p:style>
+          </p:cxnSp>
+          <p:sp>
+            <p:nvSpPr>
+              <p:cNvPr id="81" name="TextBox 80">
+                <a:extLst>
+                  <a:ext uri="{FF2B5EF4-FFF2-40B4-BE49-F238E27FC236}">
+                    <a16:creationId xmlns:a16="http://schemas.microsoft.com/office/drawing/2014/main" id="{9FAEC6C5-E0D7-6E3A-CCF2-97FC7F3154D5}"/>
+                  </a:ext>
+                </a:extLst>
+              </p:cNvPr>
+              <p:cNvSpPr txBox="1"/>
+              <p:nvPr/>
+            </p:nvSpPr>
+            <p:spPr>
+              <a:xfrm>
+                <a:off x="5096347" y="2875562"/>
+                <a:ext cx="1304382" cy="169277"/>
+              </a:xfrm>
+              <a:prstGeom prst="rect">
+                <a:avLst/>
+              </a:prstGeom>
+              <a:noFill/>
+              <a:ln>
+                <a:noFill/>
+              </a:ln>
+            </p:spPr>
+            <p:txBody>
+              <a:bodyPr wrap="square" lIns="36000" rIns="36000" rtlCol="0">
+                <a:spAutoFit/>
+              </a:bodyPr>
+              <a:lstStyle/>
+              <a:p>
+                <a:pPr algn="ctr"/>
+                <a:r>
+                  <a:rPr lang="en-US" sz="500" dirty="0">
+                    <a:latin typeface="Arial" panose="020B0604020202020204" pitchFamily="34" charset="0"/>
+                    <a:cs typeface="Arial" panose="020B0604020202020204" pitchFamily="34" charset="0"/>
+                  </a:rPr>
+                  <a:t>* for patients with non-small cell lung cancer</a:t>
+                </a:r>
+              </a:p>
+            </p:txBody>
+          </p:sp>
+          <p:sp>
+            <p:nvSpPr>
+              <p:cNvPr id="19" name="TextBox 18">
+                <a:extLst>
+                  <a:ext uri="{FF2B5EF4-FFF2-40B4-BE49-F238E27FC236}">
+                    <a16:creationId xmlns:a16="http://schemas.microsoft.com/office/drawing/2014/main" id="{24C331C0-BF52-9D4F-FFF6-235B7B269563}"/>
+                  </a:ext>
+                </a:extLst>
+              </p:cNvPr>
+              <p:cNvSpPr txBox="1"/>
+              <p:nvPr/>
+            </p:nvSpPr>
+            <p:spPr>
+              <a:xfrm rot="18936829">
+                <a:off x="2354044" y="1844348"/>
+                <a:ext cx="491393" cy="169277"/>
+              </a:xfrm>
+              <a:prstGeom prst="rect">
+                <a:avLst/>
+              </a:prstGeom>
+              <a:noFill/>
+              <a:ln w="6350">
+                <a:noFill/>
+                <a:prstDash val="dash"/>
+              </a:ln>
+            </p:spPr>
+            <p:txBody>
+              <a:bodyPr wrap="square" lIns="36000" rIns="36000" rtlCol="0">
+                <a:spAutoFit/>
+              </a:bodyPr>
+              <a:lstStyle/>
+              <a:p>
+                <a:pPr algn="ctr"/>
+                <a:r>
+                  <a:rPr lang="en-US" sz="500" dirty="0">
+                    <a:latin typeface="Arial" panose="020B0604020202020204" pitchFamily="34" charset="0"/>
+                    <a:cs typeface="Arial" panose="020B0604020202020204" pitchFamily="34" charset="0"/>
+                  </a:rPr>
+                  <a:t>Translates to</a:t>
+                </a:r>
+              </a:p>
+            </p:txBody>
+          </p:sp>
+          <p:sp>
+            <p:nvSpPr>
+              <p:cNvPr id="21" name="TextBox 20">
+                <a:extLst>
+                  <a:ext uri="{FF2B5EF4-FFF2-40B4-BE49-F238E27FC236}">
+                    <a16:creationId xmlns:a16="http://schemas.microsoft.com/office/drawing/2014/main" id="{530DDF64-7A5F-CD22-D4E0-E6D58921ECD7}"/>
+                  </a:ext>
+                </a:extLst>
+              </p:cNvPr>
+              <p:cNvSpPr txBox="1"/>
+              <p:nvPr/>
+            </p:nvSpPr>
+            <p:spPr>
+              <a:xfrm rot="18936829">
+                <a:off x="3698933" y="1504470"/>
+                <a:ext cx="491393" cy="169277"/>
+              </a:xfrm>
+              <a:prstGeom prst="rect">
+                <a:avLst/>
+              </a:prstGeom>
+              <a:noFill/>
+              <a:ln w="6350">
+                <a:noFill/>
+                <a:prstDash val="dash"/>
+              </a:ln>
+            </p:spPr>
+            <p:txBody>
+              <a:bodyPr wrap="square" lIns="36000" rIns="36000" rtlCol="0">
+                <a:spAutoFit/>
+              </a:bodyPr>
+              <a:lstStyle/>
+              <a:p>
+                <a:pPr algn="ctr"/>
+                <a:r>
+                  <a:rPr lang="en-US" sz="500" dirty="0">
+                    <a:latin typeface="Arial" panose="020B0604020202020204" pitchFamily="34" charset="0"/>
+                    <a:cs typeface="Arial" panose="020B0604020202020204" pitchFamily="34" charset="0"/>
+                  </a:rPr>
+                  <a:t>Member of</a:t>
+                </a:r>
+              </a:p>
+            </p:txBody>
+          </p:sp>
+        </p:grpSp>
         <p:sp>
           <p:nvSpPr>
-            <p:cNvPr id="2" name="TextBox 1">
+            <p:cNvPr id="16" name="TextBox 15">
               <a:extLst>
                 <a:ext uri="{FF2B5EF4-FFF2-40B4-BE49-F238E27FC236}">
-                  <a16:creationId xmlns:a16="http://schemas.microsoft.com/office/drawing/2014/main" id="{9EE20482-83F3-E704-19BC-C7CA6E0219D4}"/>
+                  <a16:creationId xmlns:a16="http://schemas.microsoft.com/office/drawing/2014/main" id="{1DC77474-1CEB-2CD4-9022-1CD95C39004E}"/>
                 </a:ext>
               </a:extLst>
             </p:cNvPr>
@@ -3448,1157 +5402,8 @@
           </p:nvSpPr>
           <p:spPr>
             <a:xfrm>
-              <a:off x="62471" y="1230620"/>
-              <a:ext cx="1007999" cy="169277"/>
-            </a:xfrm>
-            <a:prstGeom prst="rect">
-              <a:avLst/>
-            </a:prstGeom>
-            <a:solidFill>
-              <a:srgbClr val="F4B9BE">
-                <a:alpha val="49804"/>
-              </a:srgbClr>
-            </a:solidFill>
-            <a:ln>
-              <a:noFill/>
-            </a:ln>
-          </p:spPr>
-          <p:txBody>
-            <a:bodyPr wrap="square" lIns="36000" rIns="36000" rtlCol="0">
-              <a:spAutoFit/>
-            </a:bodyPr>
-            <a:lstStyle/>
-            <a:p>
-              <a:pPr algn="ctr"/>
-              <a:r>
-                <a:rPr lang="en-US" sz="500" dirty="0">
-                  <a:latin typeface="Arial" panose="020B0604020202020204" pitchFamily="34" charset="0"/>
-                  <a:cs typeface="Arial" panose="020B0604020202020204" pitchFamily="34" charset="0"/>
-                </a:rPr>
-                <a:t>chr7:g.55174772_55174786del </a:t>
-              </a:r>
-            </a:p>
-          </p:txBody>
-        </p:sp>
-        <p:sp>
-          <p:nvSpPr>
-            <p:cNvPr id="5" name="TextBox 4">
-              <a:extLst>
-                <a:ext uri="{FF2B5EF4-FFF2-40B4-BE49-F238E27FC236}">
-                  <a16:creationId xmlns:a16="http://schemas.microsoft.com/office/drawing/2014/main" id="{D24020EF-DAE7-7580-1A27-3A677A2952E8}"/>
-                </a:ext>
-              </a:extLst>
-            </p:cNvPr>
-            <p:cNvSpPr txBox="1"/>
-            <p:nvPr/>
-          </p:nvSpPr>
-          <p:spPr>
-            <a:xfrm>
-              <a:off x="62471" y="1568086"/>
-              <a:ext cx="1007999" cy="169277"/>
-            </a:xfrm>
-            <a:prstGeom prst="rect">
-              <a:avLst/>
-            </a:prstGeom>
-            <a:solidFill>
-              <a:srgbClr val="F4B9BE">
-                <a:alpha val="49804"/>
-              </a:srgbClr>
-            </a:solidFill>
-            <a:ln>
-              <a:noFill/>
-            </a:ln>
-          </p:spPr>
-          <p:txBody>
-            <a:bodyPr wrap="square" lIns="36000" rIns="36000" rtlCol="0">
-              <a:spAutoFit/>
-            </a:bodyPr>
-            <a:lstStyle/>
-            <a:p>
-              <a:pPr algn="ctr"/>
-              <a:r>
-                <a:rPr lang="en-US" sz="500" dirty="0">
-                  <a:latin typeface="Arial" panose="020B0604020202020204" pitchFamily="34" charset="0"/>
-                  <a:cs typeface="Arial" panose="020B0604020202020204" pitchFamily="34" charset="0"/>
-                </a:rPr>
-                <a:t>chr7:g.55174773_55174787del </a:t>
-              </a:r>
-            </a:p>
-          </p:txBody>
-        </p:sp>
-        <p:sp>
-          <p:nvSpPr>
-            <p:cNvPr id="6" name="TextBox 5">
-              <a:extLst>
-                <a:ext uri="{FF2B5EF4-FFF2-40B4-BE49-F238E27FC236}">
-                  <a16:creationId xmlns:a16="http://schemas.microsoft.com/office/drawing/2014/main" id="{84C94FAF-6BF8-88A2-F9EC-DBC082CAEDFC}"/>
-                </a:ext>
-              </a:extLst>
-            </p:cNvPr>
-            <p:cNvSpPr txBox="1"/>
-            <p:nvPr/>
-          </p:nvSpPr>
-          <p:spPr>
-            <a:xfrm>
-              <a:off x="1395036" y="1230620"/>
-              <a:ext cx="1007999" cy="169277"/>
-            </a:xfrm>
-            <a:prstGeom prst="rect">
-              <a:avLst/>
-            </a:prstGeom>
-            <a:solidFill>
-              <a:srgbClr val="F4B9BE">
-                <a:alpha val="49804"/>
-              </a:srgbClr>
-            </a:solidFill>
-            <a:ln>
-              <a:noFill/>
-            </a:ln>
-          </p:spPr>
-          <p:txBody>
-            <a:bodyPr wrap="square" lIns="36000" rIns="36000" rtlCol="0">
-              <a:spAutoFit/>
-            </a:bodyPr>
-            <a:lstStyle/>
-            <a:p>
-              <a:pPr algn="ctr"/>
-              <a:r>
-                <a:rPr lang="en-US" sz="500" dirty="0">
-                  <a:latin typeface="Arial" panose="020B0604020202020204" pitchFamily="34" charset="0"/>
-                  <a:cs typeface="Arial" panose="020B0604020202020204" pitchFamily="34" charset="0"/>
-                </a:rPr>
-                <a:t>NM_005228.5:c.2235_2249del</a:t>
-              </a:r>
-            </a:p>
-          </p:txBody>
-        </p:sp>
-        <p:sp>
-          <p:nvSpPr>
-            <p:cNvPr id="7" name="TextBox 6">
-              <a:extLst>
-                <a:ext uri="{FF2B5EF4-FFF2-40B4-BE49-F238E27FC236}">
-                  <a16:creationId xmlns:a16="http://schemas.microsoft.com/office/drawing/2014/main" id="{50705F86-3F87-DDA7-EA53-07B81A7B400C}"/>
-                </a:ext>
-              </a:extLst>
-            </p:cNvPr>
-            <p:cNvSpPr txBox="1"/>
-            <p:nvPr/>
-          </p:nvSpPr>
-          <p:spPr>
-            <a:xfrm>
-              <a:off x="1395037" y="1568086"/>
-              <a:ext cx="1007999" cy="169277"/>
-            </a:xfrm>
-            <a:prstGeom prst="rect">
-              <a:avLst/>
-            </a:prstGeom>
-            <a:solidFill>
-              <a:srgbClr val="F4B9BE">
-                <a:alpha val="49804"/>
-              </a:srgbClr>
-            </a:solidFill>
-            <a:ln>
-              <a:noFill/>
-            </a:ln>
-          </p:spPr>
-          <p:txBody>
-            <a:bodyPr wrap="square" lIns="36000" rIns="36000" rtlCol="0">
-              <a:spAutoFit/>
-            </a:bodyPr>
-            <a:lstStyle/>
-            <a:p>
-              <a:pPr algn="ctr"/>
-              <a:r>
-                <a:rPr lang="en-US" sz="500" dirty="0">
-                  <a:latin typeface="Arial" panose="020B0604020202020204" pitchFamily="34" charset="0"/>
-                  <a:cs typeface="Arial" panose="020B0604020202020204" pitchFamily="34" charset="0"/>
-                </a:rPr>
-                <a:t>NM_005228.5:c.2236_2250del</a:t>
-              </a:r>
-            </a:p>
-          </p:txBody>
-        </p:sp>
-        <p:sp>
-          <p:nvSpPr>
-            <p:cNvPr id="8" name="TextBox 7">
-              <a:extLst>
-                <a:ext uri="{FF2B5EF4-FFF2-40B4-BE49-F238E27FC236}">
-                  <a16:creationId xmlns:a16="http://schemas.microsoft.com/office/drawing/2014/main" id="{48668156-FF50-48D8-827E-D270CE87599C}"/>
-                </a:ext>
-              </a:extLst>
-            </p:cNvPr>
-            <p:cNvSpPr txBox="1"/>
-            <p:nvPr/>
-          </p:nvSpPr>
-          <p:spPr>
-            <a:xfrm>
-              <a:off x="2727601" y="1230620"/>
-              <a:ext cx="1007999" cy="169277"/>
-            </a:xfrm>
-            <a:prstGeom prst="rect">
-              <a:avLst/>
-            </a:prstGeom>
-            <a:solidFill>
-              <a:srgbClr val="F4B9BE">
-                <a:alpha val="49804"/>
-              </a:srgbClr>
-            </a:solidFill>
-            <a:ln>
-              <a:noFill/>
-            </a:ln>
-          </p:spPr>
-          <p:txBody>
-            <a:bodyPr wrap="square" lIns="36000" rIns="36000" rtlCol="0">
-              <a:spAutoFit/>
-            </a:bodyPr>
-            <a:lstStyle/>
-            <a:p>
-              <a:pPr algn="ctr"/>
-              <a:r>
-                <a:rPr lang="en-US" sz="500" dirty="0">
-                  <a:latin typeface="Arial" panose="020B0604020202020204" pitchFamily="34" charset="0"/>
-                  <a:cs typeface="Arial" panose="020B0604020202020204" pitchFamily="34" charset="0"/>
-                </a:rPr>
-                <a:t>NP_005219.2:p.E746_A750del</a:t>
-              </a:r>
-            </a:p>
-          </p:txBody>
-        </p:sp>
-        <p:sp>
-          <p:nvSpPr>
-            <p:cNvPr id="9" name="TextBox 8">
-              <a:extLst>
-                <a:ext uri="{FF2B5EF4-FFF2-40B4-BE49-F238E27FC236}">
-                  <a16:creationId xmlns:a16="http://schemas.microsoft.com/office/drawing/2014/main" id="{77075C77-B677-3A1B-3EDE-A1AE597830BD}"/>
-                </a:ext>
-              </a:extLst>
-            </p:cNvPr>
-            <p:cNvSpPr txBox="1"/>
-            <p:nvPr/>
-          </p:nvSpPr>
-          <p:spPr>
-            <a:xfrm>
-              <a:off x="2727599" y="1568086"/>
-              <a:ext cx="1007999" cy="169277"/>
-            </a:xfrm>
-            <a:prstGeom prst="rect">
-              <a:avLst/>
-            </a:prstGeom>
-            <a:solidFill>
-              <a:srgbClr val="F4B9BE">
-                <a:alpha val="50000"/>
-              </a:srgbClr>
-            </a:solidFill>
-            <a:ln w="6350">
-              <a:noFill/>
-              <a:prstDash val="dash"/>
-            </a:ln>
-          </p:spPr>
-          <p:txBody>
-            <a:bodyPr wrap="square" lIns="36000" rIns="36000" rtlCol="0">
-              <a:spAutoFit/>
-            </a:bodyPr>
-            <a:lstStyle/>
-            <a:p>
-              <a:pPr algn="ctr"/>
-              <a:r>
-                <a:rPr lang="en-US" sz="500" dirty="0">
-                  <a:latin typeface="Arial" panose="020B0604020202020204" pitchFamily="34" charset="0"/>
-                  <a:cs typeface="Arial" panose="020B0604020202020204" pitchFamily="34" charset="0"/>
-                </a:rPr>
-                <a:t>NP_005219.2:p.L747_T751del</a:t>
-              </a:r>
-            </a:p>
-          </p:txBody>
-        </p:sp>
-        <p:sp>
-          <p:nvSpPr>
-            <p:cNvPr id="10" name="TextBox 9">
-              <a:extLst>
-                <a:ext uri="{FF2B5EF4-FFF2-40B4-BE49-F238E27FC236}">
-                  <a16:creationId xmlns:a16="http://schemas.microsoft.com/office/drawing/2014/main" id="{0A958154-89D9-64ED-1D25-FDD01538E651}"/>
-                </a:ext>
-              </a:extLst>
-            </p:cNvPr>
-            <p:cNvSpPr txBox="1"/>
-            <p:nvPr/>
-          </p:nvSpPr>
-          <p:spPr>
-            <a:xfrm>
-              <a:off x="4060166" y="1230620"/>
-              <a:ext cx="1007999" cy="169277"/>
-            </a:xfrm>
-            <a:prstGeom prst="rect">
-              <a:avLst/>
-            </a:prstGeom>
-            <a:solidFill>
-              <a:srgbClr val="CF5C86">
-                <a:alpha val="49804"/>
-              </a:srgbClr>
-            </a:solidFill>
-            <a:ln>
-              <a:noFill/>
-            </a:ln>
-          </p:spPr>
-          <p:txBody>
-            <a:bodyPr wrap="square" lIns="36000" rIns="36000" rtlCol="0">
-              <a:spAutoFit/>
-            </a:bodyPr>
-            <a:lstStyle/>
-            <a:p>
-              <a:pPr algn="ctr"/>
-              <a:r>
-                <a:rPr lang="en-US" sz="500" i="1" dirty="0">
-                  <a:latin typeface="Arial" panose="020B0604020202020204" pitchFamily="34" charset="0"/>
-                  <a:cs typeface="Arial" panose="020B0604020202020204" pitchFamily="34" charset="0"/>
-                </a:rPr>
-                <a:t>EGFR</a:t>
-              </a:r>
-              <a:r>
-                <a:rPr lang="en-US" sz="500" dirty="0">
-                  <a:latin typeface="Arial" panose="020B0604020202020204" pitchFamily="34" charset="0"/>
-                  <a:cs typeface="Arial" panose="020B0604020202020204" pitchFamily="34" charset="0"/>
-                </a:rPr>
-                <a:t> exon 19 deletion</a:t>
-              </a:r>
-            </a:p>
-          </p:txBody>
-        </p:sp>
-        <p:sp>
-          <p:nvSpPr>
-            <p:cNvPr id="11" name="TextBox 10">
-              <a:extLst>
-                <a:ext uri="{FF2B5EF4-FFF2-40B4-BE49-F238E27FC236}">
-                  <a16:creationId xmlns:a16="http://schemas.microsoft.com/office/drawing/2014/main" id="{CB4250BE-9C57-45BE-1786-D1FE5FF820F9}"/>
-                </a:ext>
-              </a:extLst>
-            </p:cNvPr>
-            <p:cNvSpPr txBox="1"/>
-            <p:nvPr/>
-          </p:nvSpPr>
-          <p:spPr>
-            <a:xfrm>
-              <a:off x="5392731" y="1230620"/>
-              <a:ext cx="1007999" cy="169277"/>
-            </a:xfrm>
-            <a:prstGeom prst="rect">
-              <a:avLst/>
-            </a:prstGeom>
-            <a:solidFill>
-              <a:srgbClr val="867DCE">
-                <a:alpha val="50196"/>
-              </a:srgbClr>
-            </a:solidFill>
-          </p:spPr>
-          <p:txBody>
-            <a:bodyPr wrap="square" lIns="36000" rIns="36000" rtlCol="0">
-              <a:spAutoFit/>
-            </a:bodyPr>
-            <a:lstStyle/>
-            <a:p>
-              <a:pPr algn="ctr"/>
-              <a:r>
-                <a:rPr lang="en-US" sz="500" dirty="0">
-                  <a:latin typeface="Arial" panose="020B0604020202020204" pitchFamily="34" charset="0"/>
-                  <a:cs typeface="Arial" panose="020B0604020202020204" pitchFamily="34" charset="0"/>
-                </a:rPr>
-                <a:t>Response to Dacomitinib*</a:t>
-              </a:r>
-            </a:p>
-          </p:txBody>
-        </p:sp>
-        <p:sp>
-          <p:nvSpPr>
-            <p:cNvPr id="12" name="TextBox 11">
-              <a:extLst>
-                <a:ext uri="{FF2B5EF4-FFF2-40B4-BE49-F238E27FC236}">
-                  <a16:creationId xmlns:a16="http://schemas.microsoft.com/office/drawing/2014/main" id="{D0416FCA-63E8-0776-1540-D8DD552AA940}"/>
-                </a:ext>
-              </a:extLst>
-            </p:cNvPr>
-            <p:cNvSpPr txBox="1"/>
-            <p:nvPr/>
-          </p:nvSpPr>
-          <p:spPr>
-            <a:xfrm>
-              <a:off x="5392730" y="1568086"/>
-              <a:ext cx="1007999" cy="169277"/>
-            </a:xfrm>
-            <a:prstGeom prst="rect">
-              <a:avLst/>
-            </a:prstGeom>
-            <a:solidFill>
-              <a:srgbClr val="867DCE">
-                <a:alpha val="50196"/>
-              </a:srgbClr>
-            </a:solidFill>
-          </p:spPr>
-          <p:txBody>
-            <a:bodyPr wrap="square" lIns="36000" rIns="36000" rtlCol="0">
-              <a:spAutoFit/>
-            </a:bodyPr>
-            <a:lstStyle/>
-            <a:p>
-              <a:pPr algn="ctr"/>
-              <a:r>
-                <a:rPr lang="en-US" sz="500" dirty="0">
-                  <a:latin typeface="Arial" panose="020B0604020202020204" pitchFamily="34" charset="0"/>
-                  <a:cs typeface="Arial" panose="020B0604020202020204" pitchFamily="34" charset="0"/>
-                </a:rPr>
-                <a:t>Response to Erlotinib*</a:t>
-              </a:r>
-            </a:p>
-          </p:txBody>
-        </p:sp>
-        <p:sp>
-          <p:nvSpPr>
-            <p:cNvPr id="13" name="TextBox 12">
-              <a:extLst>
-                <a:ext uri="{FF2B5EF4-FFF2-40B4-BE49-F238E27FC236}">
-                  <a16:creationId xmlns:a16="http://schemas.microsoft.com/office/drawing/2014/main" id="{DAAF8117-CD47-8768-DC7C-A7CDFB7B4C28}"/>
-                </a:ext>
-              </a:extLst>
-            </p:cNvPr>
-            <p:cNvSpPr txBox="1"/>
-            <p:nvPr/>
-          </p:nvSpPr>
-          <p:spPr>
-            <a:xfrm>
-              <a:off x="5392730" y="1905552"/>
-              <a:ext cx="1007999" cy="169277"/>
-            </a:xfrm>
-            <a:prstGeom prst="rect">
-              <a:avLst/>
-            </a:prstGeom>
-            <a:solidFill>
-              <a:srgbClr val="867DCE">
-                <a:alpha val="50196"/>
-              </a:srgbClr>
-            </a:solidFill>
-          </p:spPr>
-          <p:txBody>
-            <a:bodyPr wrap="square" rtlCol="0">
-              <a:spAutoFit/>
-            </a:bodyPr>
-            <a:lstStyle/>
-            <a:p>
-              <a:pPr algn="ctr"/>
-              <a:r>
-                <a:rPr lang="en-US" sz="500" dirty="0">
-                  <a:latin typeface="Arial" panose="020B0604020202020204" pitchFamily="34" charset="0"/>
-                  <a:cs typeface="Arial" panose="020B0604020202020204" pitchFamily="34" charset="0"/>
-                </a:rPr>
-                <a:t>Response to Osimertinib*</a:t>
-              </a:r>
-            </a:p>
-          </p:txBody>
-        </p:sp>
-        <p:sp>
-          <p:nvSpPr>
-            <p:cNvPr id="14" name="TextBox 13">
-              <a:extLst>
-                <a:ext uri="{FF2B5EF4-FFF2-40B4-BE49-F238E27FC236}">
-                  <a16:creationId xmlns:a16="http://schemas.microsoft.com/office/drawing/2014/main" id="{BB9B28AA-0297-BEF1-74E5-5E89CDAFBAF2}"/>
-                </a:ext>
-              </a:extLst>
-            </p:cNvPr>
-            <p:cNvSpPr txBox="1"/>
-            <p:nvPr/>
-          </p:nvSpPr>
-          <p:spPr>
-            <a:xfrm>
-              <a:off x="62470" y="1905552"/>
-              <a:ext cx="1007999" cy="169277"/>
-            </a:xfrm>
-            <a:prstGeom prst="rect">
-              <a:avLst/>
-            </a:prstGeom>
-            <a:solidFill>
-              <a:srgbClr val="F4B9BE">
-                <a:alpha val="50000"/>
-              </a:srgbClr>
-            </a:solidFill>
-            <a:ln w="6350">
-              <a:noFill/>
-              <a:prstDash val="dash"/>
-            </a:ln>
-          </p:spPr>
-          <p:txBody>
-            <a:bodyPr wrap="square" lIns="36000" rIns="36000" rtlCol="0">
-              <a:spAutoFit/>
-            </a:bodyPr>
-            <a:lstStyle/>
-            <a:p>
-              <a:pPr algn="ctr"/>
-              <a:r>
-                <a:rPr lang="en-US" sz="500" dirty="0">
-                  <a:latin typeface="Arial" panose="020B0604020202020204" pitchFamily="34" charset="0"/>
-                  <a:cs typeface="Arial" panose="020B0604020202020204" pitchFamily="34" charset="0"/>
-                </a:rPr>
-                <a:t>chr7:g.55174775_55174789del </a:t>
-              </a:r>
-            </a:p>
-          </p:txBody>
-        </p:sp>
-        <p:cxnSp>
-          <p:nvCxnSpPr>
-            <p:cNvPr id="18" name="Straight Arrow Connector 17">
-              <a:extLst>
-                <a:ext uri="{FF2B5EF4-FFF2-40B4-BE49-F238E27FC236}">
-                  <a16:creationId xmlns:a16="http://schemas.microsoft.com/office/drawing/2014/main" id="{50031A52-D40A-5D7D-D75A-658F64957F17}"/>
-                </a:ext>
-              </a:extLst>
-            </p:cNvPr>
-            <p:cNvCxnSpPr>
-              <a:cxnSpLocks/>
-              <a:stCxn id="2" idx="3"/>
-              <a:endCxn id="6" idx="1"/>
-            </p:cNvCxnSpPr>
-            <p:nvPr/>
-          </p:nvCxnSpPr>
-          <p:spPr>
-            <a:xfrm>
-              <a:off x="1070468" y="1315257"/>
-              <a:ext cx="324566" cy="0"/>
-            </a:xfrm>
-            <a:prstGeom prst="straightConnector1">
-              <a:avLst/>
-            </a:prstGeom>
-            <a:ln>
-              <a:solidFill>
-                <a:srgbClr val="7D3C46">
-                  <a:alpha val="74902"/>
-                </a:srgbClr>
-              </a:solidFill>
-              <a:tailEnd type="triangle"/>
-            </a:ln>
-          </p:spPr>
-          <p:style>
-            <a:lnRef idx="1">
-              <a:schemeClr val="dk1"/>
-            </a:lnRef>
-            <a:fillRef idx="0">
-              <a:schemeClr val="dk1"/>
-            </a:fillRef>
-            <a:effectRef idx="0">
-              <a:schemeClr val="dk1"/>
-            </a:effectRef>
-            <a:fontRef idx="minor">
-              <a:schemeClr val="tx1"/>
-            </a:fontRef>
-          </p:style>
-        </p:cxnSp>
-        <p:cxnSp>
-          <p:nvCxnSpPr>
-            <p:cNvPr id="20" name="Straight Arrow Connector 19">
-              <a:extLst>
-                <a:ext uri="{FF2B5EF4-FFF2-40B4-BE49-F238E27FC236}">
-                  <a16:creationId xmlns:a16="http://schemas.microsoft.com/office/drawing/2014/main" id="{6B276836-0882-5A4A-D8BB-AE1B8169256C}"/>
-                </a:ext>
-              </a:extLst>
-            </p:cNvPr>
-            <p:cNvCxnSpPr>
-              <a:cxnSpLocks/>
-              <a:stCxn id="5" idx="3"/>
-              <a:endCxn id="7" idx="1"/>
-            </p:cNvCxnSpPr>
-            <p:nvPr/>
-          </p:nvCxnSpPr>
-          <p:spPr>
-            <a:xfrm>
-              <a:off x="1070470" y="1652723"/>
-              <a:ext cx="324567" cy="0"/>
-            </a:xfrm>
-            <a:prstGeom prst="straightConnector1">
-              <a:avLst/>
-            </a:prstGeom>
-            <a:ln>
-              <a:solidFill>
-                <a:srgbClr val="7D3C46">
-                  <a:alpha val="74902"/>
-                </a:srgbClr>
-              </a:solidFill>
-              <a:tailEnd type="triangle"/>
-            </a:ln>
-          </p:spPr>
-          <p:style>
-            <a:lnRef idx="1">
-              <a:schemeClr val="dk1"/>
-            </a:lnRef>
-            <a:fillRef idx="0">
-              <a:schemeClr val="dk1"/>
-            </a:fillRef>
-            <a:effectRef idx="0">
-              <a:schemeClr val="dk1"/>
-            </a:effectRef>
-            <a:fontRef idx="minor">
-              <a:schemeClr val="tx1"/>
-            </a:fontRef>
-          </p:style>
-        </p:cxnSp>
-        <p:cxnSp>
-          <p:nvCxnSpPr>
-            <p:cNvPr id="22" name="Straight Arrow Connector 21">
-              <a:extLst>
-                <a:ext uri="{FF2B5EF4-FFF2-40B4-BE49-F238E27FC236}">
-                  <a16:creationId xmlns:a16="http://schemas.microsoft.com/office/drawing/2014/main" id="{6574F2FB-7BB7-FE24-6B06-90C80B07D74A}"/>
-                </a:ext>
-              </a:extLst>
-            </p:cNvPr>
-            <p:cNvCxnSpPr>
-              <a:stCxn id="6" idx="3"/>
-              <a:endCxn id="8" idx="1"/>
-            </p:cNvCxnSpPr>
-            <p:nvPr/>
-          </p:nvCxnSpPr>
-          <p:spPr>
-            <a:xfrm>
-              <a:off x="2403033" y="1315257"/>
-              <a:ext cx="324566" cy="0"/>
-            </a:xfrm>
-            <a:prstGeom prst="straightConnector1">
-              <a:avLst/>
-            </a:prstGeom>
-            <a:ln>
-              <a:solidFill>
-                <a:srgbClr val="7D3C46">
-                  <a:alpha val="74902"/>
-                </a:srgbClr>
-              </a:solidFill>
-              <a:tailEnd type="triangle"/>
-            </a:ln>
-          </p:spPr>
-          <p:style>
-            <a:lnRef idx="1">
-              <a:schemeClr val="dk1"/>
-            </a:lnRef>
-            <a:fillRef idx="0">
-              <a:schemeClr val="dk1"/>
-            </a:fillRef>
-            <a:effectRef idx="0">
-              <a:schemeClr val="dk1"/>
-            </a:effectRef>
-            <a:fontRef idx="minor">
-              <a:schemeClr val="tx1"/>
-            </a:fontRef>
-          </p:style>
-        </p:cxnSp>
-        <p:cxnSp>
-          <p:nvCxnSpPr>
-            <p:cNvPr id="24" name="Straight Arrow Connector 23">
-              <a:extLst>
-                <a:ext uri="{FF2B5EF4-FFF2-40B4-BE49-F238E27FC236}">
-                  <a16:creationId xmlns:a16="http://schemas.microsoft.com/office/drawing/2014/main" id="{DB132889-9CA6-6E55-D684-3A2D6336C838}"/>
-                </a:ext>
-              </a:extLst>
-            </p:cNvPr>
-            <p:cNvCxnSpPr>
-              <a:stCxn id="8" idx="3"/>
-              <a:endCxn id="10" idx="1"/>
-            </p:cNvCxnSpPr>
-            <p:nvPr/>
-          </p:nvCxnSpPr>
-          <p:spPr>
-            <a:xfrm>
-              <a:off x="3735598" y="1315257"/>
-              <a:ext cx="324566" cy="0"/>
-            </a:xfrm>
-            <a:prstGeom prst="straightConnector1">
-              <a:avLst/>
-            </a:prstGeom>
-            <a:ln>
-              <a:solidFill>
-                <a:srgbClr val="7D3C46">
-                  <a:alpha val="74902"/>
-                </a:srgbClr>
-              </a:solidFill>
-              <a:tailEnd type="triangle"/>
-            </a:ln>
-          </p:spPr>
-          <p:style>
-            <a:lnRef idx="1">
-              <a:schemeClr val="dk1"/>
-            </a:lnRef>
-            <a:fillRef idx="0">
-              <a:schemeClr val="dk1"/>
-            </a:fillRef>
-            <a:effectRef idx="0">
-              <a:schemeClr val="dk1"/>
-            </a:effectRef>
-            <a:fontRef idx="minor">
-              <a:schemeClr val="tx1"/>
-            </a:fontRef>
-          </p:style>
-        </p:cxnSp>
-        <p:cxnSp>
-          <p:nvCxnSpPr>
-            <p:cNvPr id="26" name="Straight Arrow Connector 25">
-              <a:extLst>
-                <a:ext uri="{FF2B5EF4-FFF2-40B4-BE49-F238E27FC236}">
-                  <a16:creationId xmlns:a16="http://schemas.microsoft.com/office/drawing/2014/main" id="{5905B411-71EA-E5F5-12F2-88491E2B361B}"/>
-                </a:ext>
-              </a:extLst>
-            </p:cNvPr>
-            <p:cNvCxnSpPr>
-              <a:cxnSpLocks/>
-              <a:stCxn id="10" idx="3"/>
-              <a:endCxn id="11" idx="1"/>
-            </p:cNvCxnSpPr>
-            <p:nvPr/>
-          </p:nvCxnSpPr>
-          <p:spPr>
-            <a:xfrm>
-              <a:off x="5068163" y="1315257"/>
-              <a:ext cx="324566" cy="0"/>
-            </a:xfrm>
-            <a:prstGeom prst="straightConnector1">
-              <a:avLst/>
-            </a:prstGeom>
-            <a:ln>
-              <a:solidFill>
-                <a:srgbClr val="7D3C46">
-                  <a:alpha val="74902"/>
-                </a:srgbClr>
-              </a:solidFill>
-              <a:tailEnd type="triangle"/>
-            </a:ln>
-          </p:spPr>
-          <p:style>
-            <a:lnRef idx="1">
-              <a:schemeClr val="dk1"/>
-            </a:lnRef>
-            <a:fillRef idx="0">
-              <a:schemeClr val="dk1"/>
-            </a:fillRef>
-            <a:effectRef idx="0">
-              <a:schemeClr val="dk1"/>
-            </a:effectRef>
-            <a:fontRef idx="minor">
-              <a:schemeClr val="tx1"/>
-            </a:fontRef>
-          </p:style>
-        </p:cxnSp>
-        <p:cxnSp>
-          <p:nvCxnSpPr>
-            <p:cNvPr id="36" name="Curved Connector 35">
-              <a:extLst>
-                <a:ext uri="{FF2B5EF4-FFF2-40B4-BE49-F238E27FC236}">
-                  <a16:creationId xmlns:a16="http://schemas.microsoft.com/office/drawing/2014/main" id="{56CB475F-6E25-7A89-EC46-AD322B78064E}"/>
-                </a:ext>
-              </a:extLst>
-            </p:cNvPr>
-            <p:cNvCxnSpPr>
-              <a:cxnSpLocks/>
-              <a:stCxn id="10" idx="3"/>
-              <a:endCxn id="12" idx="1"/>
-            </p:cNvCxnSpPr>
-            <p:nvPr/>
-          </p:nvCxnSpPr>
-          <p:spPr>
-            <a:xfrm>
-              <a:off x="5068165" y="1315257"/>
-              <a:ext cx="324565" cy="337466"/>
-            </a:xfrm>
-            <a:prstGeom prst="curvedConnector3">
-              <a:avLst/>
-            </a:prstGeom>
-            <a:ln>
-              <a:solidFill>
-                <a:srgbClr val="7D3C46">
-                  <a:alpha val="74902"/>
-                </a:srgbClr>
-              </a:solidFill>
-              <a:tailEnd type="triangle"/>
-            </a:ln>
-          </p:spPr>
-          <p:style>
-            <a:lnRef idx="1">
-              <a:schemeClr val="dk1"/>
-            </a:lnRef>
-            <a:fillRef idx="0">
-              <a:schemeClr val="dk1"/>
-            </a:fillRef>
-            <a:effectRef idx="0">
-              <a:schemeClr val="dk1"/>
-            </a:effectRef>
-            <a:fontRef idx="minor">
-              <a:schemeClr val="tx1"/>
-            </a:fontRef>
-          </p:style>
-        </p:cxnSp>
-        <p:cxnSp>
-          <p:nvCxnSpPr>
-            <p:cNvPr id="38" name="Curved Connector 37">
-              <a:extLst>
-                <a:ext uri="{FF2B5EF4-FFF2-40B4-BE49-F238E27FC236}">
-                  <a16:creationId xmlns:a16="http://schemas.microsoft.com/office/drawing/2014/main" id="{8C4BD1FA-0EB2-F894-B650-D6B6887977F1}"/>
-                </a:ext>
-              </a:extLst>
-            </p:cNvPr>
-            <p:cNvCxnSpPr>
-              <a:cxnSpLocks/>
-              <a:stCxn id="10" idx="3"/>
-              <a:endCxn id="13" idx="1"/>
-            </p:cNvCxnSpPr>
-            <p:nvPr/>
-          </p:nvCxnSpPr>
-          <p:spPr>
-            <a:xfrm>
-              <a:off x="5068165" y="1315257"/>
-              <a:ext cx="324565" cy="674932"/>
-            </a:xfrm>
-            <a:prstGeom prst="curvedConnector3">
-              <a:avLst/>
-            </a:prstGeom>
-            <a:ln>
-              <a:solidFill>
-                <a:srgbClr val="7D3C46">
-                  <a:alpha val="74902"/>
-                </a:srgbClr>
-              </a:solidFill>
-              <a:tailEnd type="triangle"/>
-            </a:ln>
-          </p:spPr>
-          <p:style>
-            <a:lnRef idx="1">
-              <a:schemeClr val="dk1"/>
-            </a:lnRef>
-            <a:fillRef idx="0">
-              <a:schemeClr val="dk1"/>
-            </a:fillRef>
-            <a:effectRef idx="0">
-              <a:schemeClr val="dk1"/>
-            </a:effectRef>
-            <a:fontRef idx="minor">
-              <a:schemeClr val="tx1"/>
-            </a:fontRef>
-          </p:style>
-        </p:cxnSp>
-        <p:sp>
-          <p:nvSpPr>
-            <p:cNvPr id="39" name="TextBox 38">
-              <a:extLst>
-                <a:ext uri="{FF2B5EF4-FFF2-40B4-BE49-F238E27FC236}">
-                  <a16:creationId xmlns:a16="http://schemas.microsoft.com/office/drawing/2014/main" id="{41457D82-6642-A0B5-2232-313792B23C04}"/>
-                </a:ext>
-              </a:extLst>
-            </p:cNvPr>
-            <p:cNvSpPr txBox="1"/>
-            <p:nvPr/>
-          </p:nvSpPr>
-          <p:spPr>
-            <a:xfrm>
-              <a:off x="1395035" y="1905551"/>
-              <a:ext cx="1007999" cy="169277"/>
-            </a:xfrm>
-            <a:prstGeom prst="rect">
-              <a:avLst/>
-            </a:prstGeom>
-            <a:solidFill>
-              <a:srgbClr val="F4B9BE">
-                <a:alpha val="50000"/>
-              </a:srgbClr>
-            </a:solidFill>
-            <a:ln w="6350">
-              <a:noFill/>
-              <a:prstDash val="dash"/>
-            </a:ln>
-          </p:spPr>
-          <p:txBody>
-            <a:bodyPr wrap="square" lIns="36000" rIns="36000" rtlCol="0">
-              <a:spAutoFit/>
-            </a:bodyPr>
-            <a:lstStyle/>
-            <a:p>
-              <a:pPr algn="ctr"/>
-              <a:r>
-                <a:rPr lang="en-US" sz="500" dirty="0">
-                  <a:latin typeface="Arial" panose="020B0604020202020204" pitchFamily="34" charset="0"/>
-                  <a:cs typeface="Arial" panose="020B0604020202020204" pitchFamily="34" charset="0"/>
-                </a:rPr>
-                <a:t>NM_005228.5:c.2240_2254del</a:t>
-              </a:r>
-            </a:p>
-          </p:txBody>
-        </p:sp>
-        <p:cxnSp>
-          <p:nvCxnSpPr>
-            <p:cNvPr id="44" name="Straight Arrow Connector 43">
-              <a:extLst>
-                <a:ext uri="{FF2B5EF4-FFF2-40B4-BE49-F238E27FC236}">
-                  <a16:creationId xmlns:a16="http://schemas.microsoft.com/office/drawing/2014/main" id="{DE514F6A-3928-0558-CC02-4D606C790DD0}"/>
-                </a:ext>
-              </a:extLst>
-            </p:cNvPr>
-            <p:cNvCxnSpPr>
-              <a:cxnSpLocks/>
-              <a:stCxn id="14" idx="3"/>
-              <a:endCxn id="39" idx="1"/>
-            </p:cNvCxnSpPr>
-            <p:nvPr/>
-          </p:nvCxnSpPr>
-          <p:spPr>
-            <a:xfrm flipV="1">
-              <a:off x="1070467" y="1990190"/>
-              <a:ext cx="324566" cy="1"/>
-            </a:xfrm>
-            <a:prstGeom prst="straightConnector1">
-              <a:avLst/>
-            </a:prstGeom>
-            <a:ln>
-              <a:solidFill>
-                <a:srgbClr val="7D3C46">
-                  <a:alpha val="75000"/>
-                </a:srgbClr>
-              </a:solidFill>
-              <a:tailEnd type="triangle"/>
-            </a:ln>
-          </p:spPr>
-          <p:style>
-            <a:lnRef idx="1">
-              <a:schemeClr val="dk1"/>
-            </a:lnRef>
-            <a:fillRef idx="0">
-              <a:schemeClr val="dk1"/>
-            </a:fillRef>
-            <a:effectRef idx="0">
-              <a:schemeClr val="dk1"/>
-            </a:effectRef>
-            <a:fontRef idx="minor">
-              <a:schemeClr val="tx1"/>
-            </a:fontRef>
-          </p:style>
-        </p:cxnSp>
-        <p:sp>
-          <p:nvSpPr>
-            <p:cNvPr id="54" name="TextBox 53">
-              <a:extLst>
-                <a:ext uri="{FF2B5EF4-FFF2-40B4-BE49-F238E27FC236}">
-                  <a16:creationId xmlns:a16="http://schemas.microsoft.com/office/drawing/2014/main" id="{9C84E535-D658-5A31-612E-EE68B09A4513}"/>
-                </a:ext>
-              </a:extLst>
-            </p:cNvPr>
-            <p:cNvSpPr txBox="1"/>
-            <p:nvPr/>
-          </p:nvSpPr>
-          <p:spPr>
-            <a:xfrm>
-              <a:off x="62470" y="2474216"/>
-              <a:ext cx="5005693" cy="184120"/>
-            </a:xfrm>
-            <a:prstGeom prst="rect">
-              <a:avLst/>
-            </a:prstGeom>
-            <a:noFill/>
-            <a:ln>
-              <a:noFill/>
-            </a:ln>
-          </p:spPr>
-          <p:txBody>
-            <a:bodyPr wrap="square" rtlCol="0">
-              <a:spAutoFit/>
-            </a:bodyPr>
-            <a:lstStyle/>
-            <a:p>
-              <a:pPr algn="ctr"/>
-              <a:r>
-                <a:rPr lang="en-US" sz="600" dirty="0">
-                  <a:latin typeface="Arial" panose="020B0604020202020204" pitchFamily="34" charset="0"/>
-                  <a:cs typeface="Arial" panose="020B0604020202020204" pitchFamily="34" charset="0"/>
-                </a:rPr>
-                <a:t>Categorical due to:</a:t>
-              </a:r>
-            </a:p>
-          </p:txBody>
-        </p:sp>
-        <p:sp>
-          <p:nvSpPr>
-            <p:cNvPr id="55" name="TextBox 54">
-              <a:extLst>
-                <a:ext uri="{FF2B5EF4-FFF2-40B4-BE49-F238E27FC236}">
-                  <a16:creationId xmlns:a16="http://schemas.microsoft.com/office/drawing/2014/main" id="{411A0F2A-AC68-719D-2D75-5A31795C7B80}"/>
-                </a:ext>
-              </a:extLst>
-            </p:cNvPr>
-            <p:cNvSpPr txBox="1"/>
-            <p:nvPr/>
-          </p:nvSpPr>
-          <p:spPr>
-            <a:xfrm>
-              <a:off x="62470" y="2675508"/>
-              <a:ext cx="1007999" cy="369332"/>
-            </a:xfrm>
-            <a:prstGeom prst="rect">
-              <a:avLst/>
-            </a:prstGeom>
-            <a:solidFill>
-              <a:srgbClr val="B78A12">
-                <a:alpha val="25098"/>
-              </a:srgbClr>
-            </a:solidFill>
-          </p:spPr>
-          <p:txBody>
-            <a:bodyPr wrap="square" rtlCol="0">
-              <a:spAutoFit/>
-            </a:bodyPr>
-            <a:lstStyle/>
-            <a:p>
-              <a:pPr algn="ctr"/>
-              <a:r>
-                <a:rPr lang="en-US" sz="600" dirty="0">
-                  <a:latin typeface="Arial" panose="020B0604020202020204" pitchFamily="34" charset="0"/>
-                  <a:cs typeface="Arial" panose="020B0604020202020204" pitchFamily="34" charset="0"/>
-                </a:rPr>
-                <a:t>Reference assemblies, insertion and deletion normalization</a:t>
-              </a:r>
-            </a:p>
-          </p:txBody>
-        </p:sp>
-        <p:sp>
-          <p:nvSpPr>
-            <p:cNvPr id="56" name="TextBox 55">
-              <a:extLst>
-                <a:ext uri="{FF2B5EF4-FFF2-40B4-BE49-F238E27FC236}">
-                  <a16:creationId xmlns:a16="http://schemas.microsoft.com/office/drawing/2014/main" id="{808F9A0D-A939-6255-584C-60857390E4C5}"/>
-                </a:ext>
-              </a:extLst>
-            </p:cNvPr>
-            <p:cNvSpPr txBox="1"/>
-            <p:nvPr/>
-          </p:nvSpPr>
-          <p:spPr>
-            <a:xfrm>
-              <a:off x="1395034" y="2675508"/>
-              <a:ext cx="1007999" cy="184666"/>
-            </a:xfrm>
-            <a:prstGeom prst="rect">
-              <a:avLst/>
-            </a:prstGeom>
-            <a:solidFill>
-              <a:srgbClr val="B78A12">
-                <a:alpha val="25098"/>
-              </a:srgbClr>
-            </a:solidFill>
-          </p:spPr>
-          <p:txBody>
-            <a:bodyPr wrap="square" rtlCol="0">
-              <a:spAutoFit/>
-            </a:bodyPr>
-            <a:lstStyle/>
-            <a:p>
-              <a:pPr algn="ctr"/>
-              <a:r>
-                <a:rPr lang="en-US" sz="600" dirty="0">
-                  <a:latin typeface="Arial" panose="020B0604020202020204" pitchFamily="34" charset="0"/>
-                  <a:cs typeface="Arial" panose="020B0604020202020204" pitchFamily="34" charset="0"/>
-                </a:rPr>
-                <a:t>Transcript choice</a:t>
-              </a:r>
-            </a:p>
-          </p:txBody>
-        </p:sp>
-        <p:sp>
-          <p:nvSpPr>
-            <p:cNvPr id="57" name="TextBox 56">
-              <a:extLst>
-                <a:ext uri="{FF2B5EF4-FFF2-40B4-BE49-F238E27FC236}">
-                  <a16:creationId xmlns:a16="http://schemas.microsoft.com/office/drawing/2014/main" id="{CCCEE550-E9A4-2A61-F397-42257BCD24BF}"/>
-                </a:ext>
-              </a:extLst>
-            </p:cNvPr>
-            <p:cNvSpPr txBox="1"/>
-            <p:nvPr/>
-          </p:nvSpPr>
-          <p:spPr>
-            <a:xfrm>
-              <a:off x="2727598" y="2675507"/>
-              <a:ext cx="1007999" cy="369332"/>
-            </a:xfrm>
-            <a:prstGeom prst="rect">
-              <a:avLst/>
-            </a:prstGeom>
-            <a:solidFill>
-              <a:srgbClr val="B78A12">
-                <a:alpha val="25098"/>
-              </a:srgbClr>
-            </a:solidFill>
-          </p:spPr>
-          <p:txBody>
-            <a:bodyPr wrap="square" rtlCol="0">
-              <a:spAutoFit/>
-            </a:bodyPr>
-            <a:lstStyle/>
-            <a:p>
-              <a:pPr algn="ctr"/>
-              <a:r>
-                <a:rPr lang="en-US" sz="600" dirty="0">
-                  <a:latin typeface="Arial" panose="020B0604020202020204" pitchFamily="34" charset="0"/>
-                  <a:cs typeface="Arial" panose="020B0604020202020204" pitchFamily="34" charset="0"/>
-                </a:rPr>
-                <a:t>Codon degeneracy, protein isoforms, frameshift normalization</a:t>
-              </a:r>
-            </a:p>
-          </p:txBody>
-        </p:sp>
-        <p:sp>
-          <p:nvSpPr>
-            <p:cNvPr id="58" name="TextBox 57">
-              <a:extLst>
-                <a:ext uri="{FF2B5EF4-FFF2-40B4-BE49-F238E27FC236}">
-                  <a16:creationId xmlns:a16="http://schemas.microsoft.com/office/drawing/2014/main" id="{F6C6F662-FAAE-8DA4-727E-1A67CE46FAE0}"/>
-                </a:ext>
-              </a:extLst>
-            </p:cNvPr>
-            <p:cNvSpPr txBox="1"/>
-            <p:nvPr/>
-          </p:nvSpPr>
-          <p:spPr>
-            <a:xfrm>
-              <a:off x="4060165" y="1857752"/>
-              <a:ext cx="1007999" cy="553998"/>
-            </a:xfrm>
-            <a:prstGeom prst="rect">
-              <a:avLst/>
-            </a:prstGeom>
-            <a:solidFill>
-              <a:srgbClr val="B78A12">
-                <a:alpha val="25098"/>
-              </a:srgbClr>
-            </a:solidFill>
-          </p:spPr>
-          <p:txBody>
-            <a:bodyPr wrap="square" rtlCol="0">
-              <a:spAutoFit/>
-            </a:bodyPr>
-            <a:lstStyle/>
-            <a:p>
-              <a:pPr algn="ctr"/>
-              <a:r>
-                <a:rPr lang="en-US" sz="600" dirty="0">
-                  <a:latin typeface="Arial" panose="020B0604020202020204" pitchFamily="34" charset="0"/>
-                  <a:cs typeface="Arial" panose="020B0604020202020204" pitchFamily="34" charset="0"/>
-                </a:rPr>
-                <a:t>Describes a discrete class of possible variation in the abstract, often representing sets of assayable alterations</a:t>
-              </a:r>
-            </a:p>
-          </p:txBody>
-        </p:sp>
-        <p:sp>
-          <p:nvSpPr>
-            <p:cNvPr id="59" name="TextBox 58">
-              <a:extLst>
-                <a:ext uri="{FF2B5EF4-FFF2-40B4-BE49-F238E27FC236}">
-                  <a16:creationId xmlns:a16="http://schemas.microsoft.com/office/drawing/2014/main" id="{73E8C355-2A34-9C9D-E382-E75BE2185170}"/>
-                </a:ext>
-              </a:extLst>
-            </p:cNvPr>
-            <p:cNvSpPr txBox="1"/>
-            <p:nvPr/>
-          </p:nvSpPr>
-          <p:spPr>
-            <a:xfrm>
-              <a:off x="5392730" y="1053647"/>
-              <a:ext cx="1007999" cy="184666"/>
+              <a:off x="3198695" y="986430"/>
+              <a:ext cx="202299" cy="212687"/>
             </a:xfrm>
             <a:prstGeom prst="rect">
               <a:avLst/>
@@ -4611,23 +5416,55 @@
             </a:bodyPr>
             <a:lstStyle/>
             <a:p>
-              <a:pPr algn="ctr"/>
+              <a:pPr>
+                <a:lnSpc>
+                  <a:spcPts val="300"/>
+                </a:lnSpc>
+              </a:pPr>
               <a:r>
-                <a:rPr lang="en-US" sz="600" dirty="0">
+                <a:rPr lang="en-US" sz="500" dirty="0">
                   <a:latin typeface="Arial" panose="020B0604020202020204" pitchFamily="34" charset="0"/>
                   <a:cs typeface="Arial" panose="020B0604020202020204" pitchFamily="34" charset="0"/>
                 </a:rPr>
-                <a:t>Genomic knowledge</a:t>
+                <a:t>.</a:t>
+              </a:r>
+            </a:p>
+            <a:p>
+              <a:pPr>
+                <a:lnSpc>
+                  <a:spcPts val="300"/>
+                </a:lnSpc>
+              </a:pPr>
+              <a:r>
+                <a:rPr lang="en-US" sz="500" dirty="0">
+                  <a:latin typeface="Arial" panose="020B0604020202020204" pitchFamily="34" charset="0"/>
+                  <a:cs typeface="Arial" panose="020B0604020202020204" pitchFamily="34" charset="0"/>
+                </a:rPr>
+                <a:t>.</a:t>
+              </a:r>
+            </a:p>
+            <a:p>
+              <a:pPr>
+                <a:lnSpc>
+                  <a:spcPts val="300"/>
+                </a:lnSpc>
+              </a:pPr>
+              <a:r>
+                <a:rPr lang="en-US" sz="500" dirty="0">
+                  <a:latin typeface="Arial" panose="020B0604020202020204" pitchFamily="34" charset="0"/>
+                  <a:cs typeface="Arial" panose="020B0604020202020204" pitchFamily="34" charset="0"/>
+                </a:rPr>
+                <a:t>.</a:t>
               </a:r>
             </a:p>
           </p:txBody>
         </p:sp>
         <p:sp>
           <p:nvSpPr>
-            <p:cNvPr id="61" name="TextBox 60">
+            <p:cNvPr id="17" name="TextBox 16">
               <a:extLst>
                 <a:ext uri="{FF2B5EF4-FFF2-40B4-BE49-F238E27FC236}">
-                  <a16:creationId xmlns:a16="http://schemas.microsoft.com/office/drawing/2014/main" id="{00EDC3DA-C94E-6EBD-8EF1-AC6EF4D0F982}"/>
+                  <a16:creationId xmlns:a16="http://schemas.microsoft.com/office/drawing/2014/main" id="{CCC2B168-B774-C84A-0EC4-03870DA17137}"/>
                 </a:ext>
               </a:extLst>
             </p:cNvPr>
@@ -4636,8 +5473,8 @@
           </p:nvSpPr>
           <p:spPr>
             <a:xfrm>
-              <a:off x="2727597" y="1049071"/>
-              <a:ext cx="1007999" cy="184666"/>
+              <a:off x="4525479" y="654169"/>
+              <a:ext cx="202299" cy="212687"/>
             </a:xfrm>
             <a:prstGeom prst="rect">
               <a:avLst/>
@@ -4650,23 +5487,55 @@
             </a:bodyPr>
             <a:lstStyle/>
             <a:p>
-              <a:pPr algn="ctr"/>
+              <a:pPr>
+                <a:lnSpc>
+                  <a:spcPts val="300"/>
+                </a:lnSpc>
+              </a:pPr>
               <a:r>
-                <a:rPr lang="en-US" sz="600" dirty="0">
+                <a:rPr lang="en-US" sz="500" dirty="0">
                   <a:latin typeface="Arial" panose="020B0604020202020204" pitchFamily="34" charset="0"/>
                   <a:cs typeface="Arial" panose="020B0604020202020204" pitchFamily="34" charset="0"/>
                 </a:rPr>
-                <a:t>HGVS Protein (p.)</a:t>
+                <a:t>.</a:t>
+              </a:r>
+            </a:p>
+            <a:p>
+              <a:pPr>
+                <a:lnSpc>
+                  <a:spcPts val="300"/>
+                </a:lnSpc>
+              </a:pPr>
+              <a:r>
+                <a:rPr lang="en-US" sz="500" dirty="0">
+                  <a:latin typeface="Arial" panose="020B0604020202020204" pitchFamily="34" charset="0"/>
+                  <a:cs typeface="Arial" panose="020B0604020202020204" pitchFamily="34" charset="0"/>
+                </a:rPr>
+                <a:t>.</a:t>
+              </a:r>
+            </a:p>
+            <a:p>
+              <a:pPr>
+                <a:lnSpc>
+                  <a:spcPts val="300"/>
+                </a:lnSpc>
+              </a:pPr>
+              <a:r>
+                <a:rPr lang="en-US" sz="500" dirty="0">
+                  <a:latin typeface="Arial" panose="020B0604020202020204" pitchFamily="34" charset="0"/>
+                  <a:cs typeface="Arial" panose="020B0604020202020204" pitchFamily="34" charset="0"/>
+                </a:rPr>
+                <a:t>.</a:t>
               </a:r>
             </a:p>
           </p:txBody>
         </p:sp>
         <p:sp>
           <p:nvSpPr>
-            <p:cNvPr id="62" name="TextBox 61">
+            <p:cNvPr id="23" name="TextBox 22">
               <a:extLst>
                 <a:ext uri="{FF2B5EF4-FFF2-40B4-BE49-F238E27FC236}">
-                  <a16:creationId xmlns:a16="http://schemas.microsoft.com/office/drawing/2014/main" id="{E8610847-0CDF-17F6-4E61-829170FB622C}"/>
+                  <a16:creationId xmlns:a16="http://schemas.microsoft.com/office/drawing/2014/main" id="{991B1F7A-8380-D70F-6186-22DBDFDF268C}"/>
                 </a:ext>
               </a:extLst>
             </p:cNvPr>
@@ -4675,8 +5544,8 @@
           </p:nvSpPr>
           <p:spPr>
             <a:xfrm>
-              <a:off x="1395031" y="1053103"/>
-              <a:ext cx="1007999" cy="184666"/>
+              <a:off x="1856693" y="1304472"/>
+              <a:ext cx="202299" cy="212687"/>
             </a:xfrm>
             <a:prstGeom prst="rect">
               <a:avLst/>
@@ -4689,23 +5558,55 @@
             </a:bodyPr>
             <a:lstStyle/>
             <a:p>
-              <a:pPr algn="ctr"/>
+              <a:pPr>
+                <a:lnSpc>
+                  <a:spcPts val="300"/>
+                </a:lnSpc>
+              </a:pPr>
               <a:r>
-                <a:rPr lang="en-US" sz="600" dirty="0">
+                <a:rPr lang="en-US" sz="500" dirty="0">
                   <a:latin typeface="Arial" panose="020B0604020202020204" pitchFamily="34" charset="0"/>
                   <a:cs typeface="Arial" panose="020B0604020202020204" pitchFamily="34" charset="0"/>
                 </a:rPr>
-                <a:t>HGVS Coding DNA (c.)</a:t>
+                <a:t>.</a:t>
+              </a:r>
+            </a:p>
+            <a:p>
+              <a:pPr>
+                <a:lnSpc>
+                  <a:spcPts val="300"/>
+                </a:lnSpc>
+              </a:pPr>
+              <a:r>
+                <a:rPr lang="en-US" sz="500" dirty="0">
+                  <a:latin typeface="Arial" panose="020B0604020202020204" pitchFamily="34" charset="0"/>
+                  <a:cs typeface="Arial" panose="020B0604020202020204" pitchFamily="34" charset="0"/>
+                </a:rPr>
+                <a:t>.</a:t>
+              </a:r>
+            </a:p>
+            <a:p>
+              <a:pPr>
+                <a:lnSpc>
+                  <a:spcPts val="300"/>
+                </a:lnSpc>
+              </a:pPr>
+              <a:r>
+                <a:rPr lang="en-US" sz="500" dirty="0">
+                  <a:latin typeface="Arial" panose="020B0604020202020204" pitchFamily="34" charset="0"/>
+                  <a:cs typeface="Arial" panose="020B0604020202020204" pitchFamily="34" charset="0"/>
+                </a:rPr>
+                <a:t>.</a:t>
               </a:r>
             </a:p>
           </p:txBody>
         </p:sp>
         <p:sp>
           <p:nvSpPr>
-            <p:cNvPr id="63" name="TextBox 62">
+            <p:cNvPr id="25" name="TextBox 24">
               <a:extLst>
                 <a:ext uri="{FF2B5EF4-FFF2-40B4-BE49-F238E27FC236}">
-                  <a16:creationId xmlns:a16="http://schemas.microsoft.com/office/drawing/2014/main" id="{F5D67200-6ECC-83F4-0B3F-27ABC48B7C79}"/>
+                  <a16:creationId xmlns:a16="http://schemas.microsoft.com/office/drawing/2014/main" id="{1CB0B600-3911-A07D-9F11-BA7493E161D2}"/>
                 </a:ext>
               </a:extLst>
             </p:cNvPr>
@@ -4714,8 +5615,8 @@
           </p:nvSpPr>
           <p:spPr>
             <a:xfrm>
-              <a:off x="62464" y="1049071"/>
-              <a:ext cx="1007999" cy="184666"/>
+              <a:off x="527782" y="1660490"/>
+              <a:ext cx="202299" cy="212687"/>
             </a:xfrm>
             <a:prstGeom prst="rect">
               <a:avLst/>
@@ -4728,23 +5629,55 @@
             </a:bodyPr>
             <a:lstStyle/>
             <a:p>
-              <a:pPr algn="ctr"/>
+              <a:pPr>
+                <a:lnSpc>
+                  <a:spcPts val="300"/>
+                </a:lnSpc>
+              </a:pPr>
               <a:r>
-                <a:rPr lang="en-US" sz="600" dirty="0">
+                <a:rPr lang="en-US" sz="500" dirty="0">
                   <a:latin typeface="Arial" panose="020B0604020202020204" pitchFamily="34" charset="0"/>
                   <a:cs typeface="Arial" panose="020B0604020202020204" pitchFamily="34" charset="0"/>
                 </a:rPr>
-                <a:t>HGVS Genomic (g.)</a:t>
+                <a:t>.</a:t>
+              </a:r>
+            </a:p>
+            <a:p>
+              <a:pPr>
+                <a:lnSpc>
+                  <a:spcPts val="300"/>
+                </a:lnSpc>
+              </a:pPr>
+              <a:r>
+                <a:rPr lang="en-US" sz="500" dirty="0">
+                  <a:latin typeface="Arial" panose="020B0604020202020204" pitchFamily="34" charset="0"/>
+                  <a:cs typeface="Arial" panose="020B0604020202020204" pitchFamily="34" charset="0"/>
+                </a:rPr>
+                <a:t>.</a:t>
+              </a:r>
+            </a:p>
+            <a:p>
+              <a:pPr>
+                <a:lnSpc>
+                  <a:spcPts val="300"/>
+                </a:lnSpc>
+              </a:pPr>
+              <a:r>
+                <a:rPr lang="en-US" sz="500" dirty="0">
+                  <a:latin typeface="Arial" panose="020B0604020202020204" pitchFamily="34" charset="0"/>
+                  <a:cs typeface="Arial" panose="020B0604020202020204" pitchFamily="34" charset="0"/>
+                </a:rPr>
+                <a:t>.</a:t>
               </a:r>
             </a:p>
           </p:txBody>
         </p:sp>
         <p:sp>
           <p:nvSpPr>
-            <p:cNvPr id="65" name="TextBox 64">
+            <p:cNvPr id="27" name="TextBox 26">
               <a:extLst>
                 <a:ext uri="{FF2B5EF4-FFF2-40B4-BE49-F238E27FC236}">
-                  <a16:creationId xmlns:a16="http://schemas.microsoft.com/office/drawing/2014/main" id="{1414C298-01A0-C2CB-D4A2-2E033913A840}"/>
+                  <a16:creationId xmlns:a16="http://schemas.microsoft.com/office/drawing/2014/main" id="{78395556-08A7-2E3C-CD92-69C07A950366}"/>
                 </a:ext>
               </a:extLst>
             </p:cNvPr>
@@ -4753,8 +5686,8 @@
           </p:nvSpPr>
           <p:spPr>
             <a:xfrm>
-              <a:off x="1417639" y="828129"/>
-              <a:ext cx="3627917" cy="200055"/>
+              <a:off x="5852264" y="1660490"/>
+              <a:ext cx="202299" cy="212687"/>
             </a:xfrm>
             <a:prstGeom prst="rect">
               <a:avLst/>
@@ -4762,607 +5695,50 @@
             <a:noFill/>
           </p:spPr>
           <p:txBody>
-            <a:bodyPr wrap="none" rtlCol="0">
-              <a:spAutoFit/>
-            </a:bodyPr>
-            <a:lstStyle/>
-            <a:p>
-              <a:pPr algn="ctr"/>
-              <a:r>
-                <a:rPr lang="en-US" sz="700" dirty="0">
-                  <a:latin typeface="Arial" panose="020B0604020202020204" pitchFamily="34" charset="0"/>
-                  <a:cs typeface="Arial" panose="020B0604020202020204" pitchFamily="34" charset="0"/>
-                </a:rPr>
-                <a:t>Both specific and broadly defined sets of genomic alterations are inherently categorical</a:t>
-              </a:r>
-            </a:p>
-          </p:txBody>
-        </p:sp>
-        <p:sp>
-          <p:nvSpPr>
-            <p:cNvPr id="3" name="TextBox 2">
-              <a:extLst>
-                <a:ext uri="{FF2B5EF4-FFF2-40B4-BE49-F238E27FC236}">
-                  <a16:creationId xmlns:a16="http://schemas.microsoft.com/office/drawing/2014/main" id="{14C7CB68-3295-22A7-72AC-ACB390377782}"/>
-                </a:ext>
-              </a:extLst>
-            </p:cNvPr>
-            <p:cNvSpPr txBox="1"/>
-            <p:nvPr/>
-          </p:nvSpPr>
-          <p:spPr>
-            <a:xfrm>
-              <a:off x="5392730" y="2242475"/>
-              <a:ext cx="1007999" cy="169277"/>
-            </a:xfrm>
-            <a:prstGeom prst="rect">
-              <a:avLst/>
-            </a:prstGeom>
-            <a:solidFill>
-              <a:srgbClr val="867DCE">
-                <a:alpha val="50196"/>
-              </a:srgbClr>
-            </a:solidFill>
-          </p:spPr>
-          <p:txBody>
             <a:bodyPr wrap="square" rtlCol="0">
               <a:spAutoFit/>
             </a:bodyPr>
             <a:lstStyle/>
             <a:p>
-              <a:pPr algn="ctr"/>
+              <a:pPr>
+                <a:lnSpc>
+                  <a:spcPts val="300"/>
+                </a:lnSpc>
+              </a:pPr>
               <a:r>
                 <a:rPr lang="en-US" sz="500" dirty="0">
                   <a:latin typeface="Arial" panose="020B0604020202020204" pitchFamily="34" charset="0"/>
                   <a:cs typeface="Arial" panose="020B0604020202020204" pitchFamily="34" charset="0"/>
                 </a:rPr>
-                <a:t>Response to Osimertinib*</a:t>
+                <a:t>.</a:t>
               </a:r>
             </a:p>
-          </p:txBody>
-        </p:sp>
-        <p:sp>
-          <p:nvSpPr>
-            <p:cNvPr id="4" name="TextBox 3">
-              <a:extLst>
-                <a:ext uri="{FF2B5EF4-FFF2-40B4-BE49-F238E27FC236}">
-                  <a16:creationId xmlns:a16="http://schemas.microsoft.com/office/drawing/2014/main" id="{D4814D26-B3CB-51D3-70BD-24A1322EEBC9}"/>
-                </a:ext>
-              </a:extLst>
-            </p:cNvPr>
-            <p:cNvSpPr txBox="1"/>
-            <p:nvPr/>
-          </p:nvSpPr>
-          <p:spPr>
-            <a:xfrm>
-              <a:off x="62470" y="2242475"/>
-              <a:ext cx="1007999" cy="169277"/>
-            </a:xfrm>
-            <a:prstGeom prst="rect">
-              <a:avLst/>
-            </a:prstGeom>
-            <a:solidFill>
-              <a:srgbClr val="F4B9BE">
-                <a:alpha val="50000"/>
-              </a:srgbClr>
-            </a:solidFill>
-            <a:ln w="6350">
-              <a:noFill/>
-              <a:prstDash val="dash"/>
-            </a:ln>
-          </p:spPr>
-          <p:txBody>
-            <a:bodyPr wrap="square" lIns="36000" rIns="36000" rtlCol="0">
-              <a:spAutoFit/>
-            </a:bodyPr>
-            <a:lstStyle/>
             <a:p>
-              <a:pPr algn="ctr"/>
+              <a:pPr>
+                <a:lnSpc>
+                  <a:spcPts val="300"/>
+                </a:lnSpc>
+              </a:pPr>
               <a:r>
                 <a:rPr lang="en-US" sz="500" dirty="0">
                   <a:latin typeface="Arial" panose="020B0604020202020204" pitchFamily="34" charset="0"/>
                   <a:cs typeface="Arial" panose="020B0604020202020204" pitchFamily="34" charset="0"/>
                 </a:rPr>
-                <a:t>chr7:g.55174777_55174791del </a:t>
+                <a:t>.</a:t>
               </a:r>
             </a:p>
-          </p:txBody>
-        </p:sp>
-        <p:sp>
-          <p:nvSpPr>
-            <p:cNvPr id="15" name="TextBox 14">
-              <a:extLst>
-                <a:ext uri="{FF2B5EF4-FFF2-40B4-BE49-F238E27FC236}">
-                  <a16:creationId xmlns:a16="http://schemas.microsoft.com/office/drawing/2014/main" id="{03B5E9D5-D1FD-95E7-CEA3-E2D6134AED2F}"/>
-                </a:ext>
-              </a:extLst>
-            </p:cNvPr>
-            <p:cNvSpPr txBox="1"/>
-            <p:nvPr/>
-          </p:nvSpPr>
-          <p:spPr>
-            <a:xfrm rot="18936829">
-              <a:off x="1059556" y="2161356"/>
-              <a:ext cx="491393" cy="169277"/>
-            </a:xfrm>
-            <a:prstGeom prst="rect">
-              <a:avLst/>
-            </a:prstGeom>
-            <a:noFill/>
-            <a:ln w="6350">
-              <a:noFill/>
-              <a:prstDash val="dash"/>
-            </a:ln>
-          </p:spPr>
-          <p:txBody>
-            <a:bodyPr wrap="square" lIns="36000" rIns="36000" rtlCol="0">
-              <a:spAutoFit/>
-            </a:bodyPr>
-            <a:lstStyle/>
             <a:p>
-              <a:pPr algn="ctr"/>
+              <a:pPr>
+                <a:lnSpc>
+                  <a:spcPts val="300"/>
+                </a:lnSpc>
+              </a:pPr>
               <a:r>
                 <a:rPr lang="en-US" sz="500" dirty="0">
                   <a:latin typeface="Arial" panose="020B0604020202020204" pitchFamily="34" charset="0"/>
                   <a:cs typeface="Arial" panose="020B0604020202020204" pitchFamily="34" charset="0"/>
                 </a:rPr>
-                <a:t>Transcribes to</a:t>
-              </a:r>
-            </a:p>
-          </p:txBody>
-        </p:sp>
-        <p:sp>
-          <p:nvSpPr>
-            <p:cNvPr id="60" name="Rectangle 59">
-              <a:extLst>
-                <a:ext uri="{FF2B5EF4-FFF2-40B4-BE49-F238E27FC236}">
-                  <a16:creationId xmlns:a16="http://schemas.microsoft.com/office/drawing/2014/main" id="{4C280B47-F110-A16B-FBF1-A6849F249061}"/>
-                </a:ext>
-              </a:extLst>
-            </p:cNvPr>
-            <p:cNvSpPr/>
-            <p:nvPr/>
-          </p:nvSpPr>
-          <p:spPr>
-            <a:xfrm>
-              <a:off x="3982732" y="1230618"/>
-              <a:ext cx="77426" cy="169200"/>
-            </a:xfrm>
-            <a:prstGeom prst="rect">
-              <a:avLst/>
-            </a:prstGeom>
-            <a:noFill/>
-            <a:ln>
-              <a:noFill/>
-            </a:ln>
-          </p:spPr>
-          <p:style>
-            <a:lnRef idx="2">
-              <a:schemeClr val="accent6"/>
-            </a:lnRef>
-            <a:fillRef idx="1">
-              <a:schemeClr val="lt1"/>
-            </a:fillRef>
-            <a:effectRef idx="0">
-              <a:schemeClr val="accent6"/>
-            </a:effectRef>
-            <a:fontRef idx="minor">
-              <a:schemeClr val="dk1"/>
-            </a:fontRef>
-          </p:style>
-          <p:txBody>
-            <a:bodyPr rtlCol="0" anchor="ctr"/>
-            <a:lstStyle/>
-            <a:p>
-              <a:pPr algn="ctr"/>
-              <a:endParaRPr lang="en-US"/>
-            </a:p>
-          </p:txBody>
-        </p:sp>
-        <p:sp>
-          <p:nvSpPr>
-            <p:cNvPr id="64" name="Rectangle 63">
-              <a:extLst>
-                <a:ext uri="{FF2B5EF4-FFF2-40B4-BE49-F238E27FC236}">
-                  <a16:creationId xmlns:a16="http://schemas.microsoft.com/office/drawing/2014/main" id="{8B92D35A-E36C-A999-6FEB-8A78245AAFE0}"/>
-                </a:ext>
-              </a:extLst>
-            </p:cNvPr>
-            <p:cNvSpPr/>
-            <p:nvPr/>
-          </p:nvSpPr>
-          <p:spPr>
-            <a:xfrm>
-              <a:off x="2645613" y="1568084"/>
-              <a:ext cx="77426" cy="169200"/>
-            </a:xfrm>
-            <a:prstGeom prst="rect">
-              <a:avLst/>
-            </a:prstGeom>
-            <a:noFill/>
-            <a:ln>
-              <a:noFill/>
-            </a:ln>
-          </p:spPr>
-          <p:style>
-            <a:lnRef idx="2">
-              <a:schemeClr val="accent6"/>
-            </a:lnRef>
-            <a:fillRef idx="1">
-              <a:schemeClr val="lt1"/>
-            </a:fillRef>
-            <a:effectRef idx="0">
-              <a:schemeClr val="accent6"/>
-            </a:effectRef>
-            <a:fontRef idx="minor">
-              <a:schemeClr val="dk1"/>
-            </a:fontRef>
-          </p:style>
-          <p:txBody>
-            <a:bodyPr rtlCol="0" anchor="ctr"/>
-            <a:lstStyle/>
-            <a:p>
-              <a:pPr algn="ctr"/>
-              <a:endParaRPr lang="en-US"/>
-            </a:p>
-          </p:txBody>
-        </p:sp>
-        <p:cxnSp>
-          <p:nvCxnSpPr>
-            <p:cNvPr id="68" name="Curved Connector 67">
-              <a:extLst>
-                <a:ext uri="{FF2B5EF4-FFF2-40B4-BE49-F238E27FC236}">
-                  <a16:creationId xmlns:a16="http://schemas.microsoft.com/office/drawing/2014/main" id="{AF92620E-DAAE-043A-4F03-43F19F6DB9C6}"/>
-                </a:ext>
-              </a:extLst>
-            </p:cNvPr>
-            <p:cNvCxnSpPr>
-              <a:cxnSpLocks/>
-              <a:stCxn id="4" idx="3"/>
-            </p:cNvCxnSpPr>
-            <p:nvPr/>
-          </p:nvCxnSpPr>
-          <p:spPr>
-            <a:xfrm flipV="1">
-              <a:off x="1070467" y="1990151"/>
-              <a:ext cx="247136" cy="336963"/>
-            </a:xfrm>
-            <a:prstGeom prst="curvedConnector3">
-              <a:avLst/>
-            </a:prstGeom>
-            <a:ln>
-              <a:solidFill>
-                <a:srgbClr val="7D3C46">
-                  <a:alpha val="75000"/>
-                </a:srgbClr>
-              </a:solidFill>
-            </a:ln>
-          </p:spPr>
-          <p:style>
-            <a:lnRef idx="1">
-              <a:schemeClr val="dk1"/>
-            </a:lnRef>
-            <a:fillRef idx="0">
-              <a:schemeClr val="dk1"/>
-            </a:fillRef>
-            <a:effectRef idx="0">
-              <a:schemeClr val="dk1"/>
-            </a:effectRef>
-            <a:fontRef idx="minor">
-              <a:schemeClr val="tx1"/>
-            </a:fontRef>
-          </p:style>
-        </p:cxnSp>
-        <p:cxnSp>
-          <p:nvCxnSpPr>
-            <p:cNvPr id="70" name="Curved Connector 69">
-              <a:extLst>
-                <a:ext uri="{FF2B5EF4-FFF2-40B4-BE49-F238E27FC236}">
-                  <a16:creationId xmlns:a16="http://schemas.microsoft.com/office/drawing/2014/main" id="{1AC2272F-1211-94E7-8220-B83078CC09A8}"/>
-                </a:ext>
-              </a:extLst>
-            </p:cNvPr>
-            <p:cNvCxnSpPr>
-              <a:cxnSpLocks/>
-              <a:stCxn id="7" idx="3"/>
-            </p:cNvCxnSpPr>
-            <p:nvPr/>
-          </p:nvCxnSpPr>
-          <p:spPr>
-            <a:xfrm flipV="1">
-              <a:off x="2403034" y="1315220"/>
-              <a:ext cx="247134" cy="337505"/>
-            </a:xfrm>
-            <a:prstGeom prst="curvedConnector3">
-              <a:avLst/>
-            </a:prstGeom>
-            <a:ln>
-              <a:solidFill>
-                <a:srgbClr val="7D3C46">
-                  <a:alpha val="75000"/>
-                </a:srgbClr>
-              </a:solidFill>
-            </a:ln>
-          </p:spPr>
-          <p:style>
-            <a:lnRef idx="1">
-              <a:schemeClr val="dk1"/>
-            </a:lnRef>
-            <a:fillRef idx="0">
-              <a:schemeClr val="dk1"/>
-            </a:fillRef>
-            <a:effectRef idx="0">
-              <a:schemeClr val="dk1"/>
-            </a:effectRef>
-            <a:fontRef idx="minor">
-              <a:schemeClr val="tx1"/>
-            </a:fontRef>
-          </p:style>
-        </p:cxnSp>
-        <p:cxnSp>
-          <p:nvCxnSpPr>
-            <p:cNvPr id="72" name="Curved Connector 71">
-              <a:extLst>
-                <a:ext uri="{FF2B5EF4-FFF2-40B4-BE49-F238E27FC236}">
-                  <a16:creationId xmlns:a16="http://schemas.microsoft.com/office/drawing/2014/main" id="{9D6C1DD4-5F03-5B59-0C67-BE4CA4B1F950}"/>
-                </a:ext>
-              </a:extLst>
-            </p:cNvPr>
-            <p:cNvCxnSpPr>
-              <a:cxnSpLocks/>
-              <a:stCxn id="39" idx="3"/>
-              <a:endCxn id="64" idx="1"/>
-            </p:cNvCxnSpPr>
-            <p:nvPr/>
-          </p:nvCxnSpPr>
-          <p:spPr>
-            <a:xfrm flipV="1">
-              <a:off x="2403034" y="1652684"/>
-              <a:ext cx="242581" cy="337504"/>
-            </a:xfrm>
-            <a:prstGeom prst="curvedConnector3">
-              <a:avLst/>
-            </a:prstGeom>
-            <a:ln>
-              <a:solidFill>
-                <a:srgbClr val="7D3C46">
-                  <a:alpha val="75000"/>
-                </a:srgbClr>
-              </a:solidFill>
-            </a:ln>
-          </p:spPr>
-          <p:style>
-            <a:lnRef idx="1">
-              <a:schemeClr val="dk1"/>
-            </a:lnRef>
-            <a:fillRef idx="0">
-              <a:schemeClr val="dk1"/>
-            </a:fillRef>
-            <a:effectRef idx="0">
-              <a:schemeClr val="dk1"/>
-            </a:effectRef>
-            <a:fontRef idx="minor">
-              <a:schemeClr val="tx1"/>
-            </a:fontRef>
-          </p:style>
-        </p:cxnSp>
-        <p:cxnSp>
-          <p:nvCxnSpPr>
-            <p:cNvPr id="76" name="Curved Connector 75">
-              <a:extLst>
-                <a:ext uri="{FF2B5EF4-FFF2-40B4-BE49-F238E27FC236}">
-                  <a16:creationId xmlns:a16="http://schemas.microsoft.com/office/drawing/2014/main" id="{039CD442-36D9-E8F4-1240-6D20CB596C61}"/>
-                </a:ext>
-              </a:extLst>
-            </p:cNvPr>
-            <p:cNvCxnSpPr>
-              <a:stCxn id="9" idx="3"/>
-              <a:endCxn id="60" idx="1"/>
-            </p:cNvCxnSpPr>
-            <p:nvPr/>
-          </p:nvCxnSpPr>
-          <p:spPr>
-            <a:xfrm flipV="1">
-              <a:off x="3735596" y="1315220"/>
-              <a:ext cx="247136" cy="337505"/>
-            </a:xfrm>
-            <a:prstGeom prst="curvedConnector3">
-              <a:avLst/>
-            </a:prstGeom>
-            <a:ln>
-              <a:solidFill>
-                <a:srgbClr val="7D3C46">
-                  <a:alpha val="75000"/>
-                </a:srgbClr>
-              </a:solidFill>
-            </a:ln>
-          </p:spPr>
-          <p:style>
-            <a:lnRef idx="1">
-              <a:schemeClr val="accent1"/>
-            </a:lnRef>
-            <a:fillRef idx="0">
-              <a:schemeClr val="accent1"/>
-            </a:fillRef>
-            <a:effectRef idx="0">
-              <a:schemeClr val="accent1"/>
-            </a:effectRef>
-            <a:fontRef idx="minor">
-              <a:schemeClr val="tx1"/>
-            </a:fontRef>
-          </p:style>
-        </p:cxnSp>
-        <p:cxnSp>
-          <p:nvCxnSpPr>
-            <p:cNvPr id="78" name="Straight Arrow Connector 77">
-              <a:extLst>
-                <a:ext uri="{FF2B5EF4-FFF2-40B4-BE49-F238E27FC236}">
-                  <a16:creationId xmlns:a16="http://schemas.microsoft.com/office/drawing/2014/main" id="{40568288-5F55-E9B8-2FAC-B22BB88C4CED}"/>
-                </a:ext>
-              </a:extLst>
-            </p:cNvPr>
-            <p:cNvCxnSpPr>
-              <a:stCxn id="64" idx="1"/>
-              <a:endCxn id="9" idx="1"/>
-            </p:cNvCxnSpPr>
-            <p:nvPr/>
-          </p:nvCxnSpPr>
-          <p:spPr>
-            <a:xfrm>
-              <a:off x="2645613" y="1652686"/>
-              <a:ext cx="81984" cy="39"/>
-            </a:xfrm>
-            <a:prstGeom prst="straightConnector1">
-              <a:avLst/>
-            </a:prstGeom>
-            <a:ln>
-              <a:solidFill>
-                <a:srgbClr val="7D3C46">
-                  <a:alpha val="75000"/>
-                </a:srgbClr>
-              </a:solidFill>
-              <a:tailEnd type="triangle"/>
-            </a:ln>
-          </p:spPr>
-          <p:style>
-            <a:lnRef idx="1">
-              <a:schemeClr val="accent1"/>
-            </a:lnRef>
-            <a:fillRef idx="0">
-              <a:schemeClr val="accent1"/>
-            </a:fillRef>
-            <a:effectRef idx="0">
-              <a:schemeClr val="accent1"/>
-            </a:effectRef>
-            <a:fontRef idx="minor">
-              <a:schemeClr val="tx1"/>
-            </a:fontRef>
-          </p:style>
-        </p:cxnSp>
-        <p:sp>
-          <p:nvSpPr>
-            <p:cNvPr id="81" name="TextBox 80">
-              <a:extLst>
-                <a:ext uri="{FF2B5EF4-FFF2-40B4-BE49-F238E27FC236}">
-                  <a16:creationId xmlns:a16="http://schemas.microsoft.com/office/drawing/2014/main" id="{9FAEC6C5-E0D7-6E3A-CCF2-97FC7F3154D5}"/>
-                </a:ext>
-              </a:extLst>
-            </p:cNvPr>
-            <p:cNvSpPr txBox="1"/>
-            <p:nvPr/>
-          </p:nvSpPr>
-          <p:spPr>
-            <a:xfrm>
-              <a:off x="5096347" y="2875562"/>
-              <a:ext cx="1304382" cy="169277"/>
-            </a:xfrm>
-            <a:prstGeom prst="rect">
-              <a:avLst/>
-            </a:prstGeom>
-            <a:noFill/>
-            <a:ln>
-              <a:noFill/>
-            </a:ln>
-          </p:spPr>
-          <p:txBody>
-            <a:bodyPr wrap="square" lIns="36000" rIns="36000" rtlCol="0">
-              <a:spAutoFit/>
-            </a:bodyPr>
-            <a:lstStyle/>
-            <a:p>
-              <a:pPr algn="ctr"/>
-              <a:r>
-                <a:rPr lang="en-US" sz="500" dirty="0">
-                  <a:latin typeface="Arial" panose="020B0604020202020204" pitchFamily="34" charset="0"/>
-                  <a:cs typeface="Arial" panose="020B0604020202020204" pitchFamily="34" charset="0"/>
-                </a:rPr>
-                <a:t>* for patients with non-small cell lung cancer</a:t>
-              </a:r>
-            </a:p>
-          </p:txBody>
-        </p:sp>
-        <p:sp>
-          <p:nvSpPr>
-            <p:cNvPr id="19" name="TextBox 18">
-              <a:extLst>
-                <a:ext uri="{FF2B5EF4-FFF2-40B4-BE49-F238E27FC236}">
-                  <a16:creationId xmlns:a16="http://schemas.microsoft.com/office/drawing/2014/main" id="{24C331C0-BF52-9D4F-FFF6-235B7B269563}"/>
-                </a:ext>
-              </a:extLst>
-            </p:cNvPr>
-            <p:cNvSpPr txBox="1"/>
-            <p:nvPr/>
-          </p:nvSpPr>
-          <p:spPr>
-            <a:xfrm rot="18936829">
-              <a:off x="2354044" y="1844348"/>
-              <a:ext cx="491393" cy="169277"/>
-            </a:xfrm>
-            <a:prstGeom prst="rect">
-              <a:avLst/>
-            </a:prstGeom>
-            <a:noFill/>
-            <a:ln w="6350">
-              <a:noFill/>
-              <a:prstDash val="dash"/>
-            </a:ln>
-          </p:spPr>
-          <p:txBody>
-            <a:bodyPr wrap="square" lIns="36000" rIns="36000" rtlCol="0">
-              <a:spAutoFit/>
-            </a:bodyPr>
-            <a:lstStyle/>
-            <a:p>
-              <a:pPr algn="ctr"/>
-              <a:r>
-                <a:rPr lang="en-US" sz="500" dirty="0">
-                  <a:latin typeface="Arial" panose="020B0604020202020204" pitchFamily="34" charset="0"/>
-                  <a:cs typeface="Arial" panose="020B0604020202020204" pitchFamily="34" charset="0"/>
-                </a:rPr>
-                <a:t>Translates to</a:t>
-              </a:r>
-            </a:p>
-          </p:txBody>
-        </p:sp>
-        <p:sp>
-          <p:nvSpPr>
-            <p:cNvPr id="21" name="TextBox 20">
-              <a:extLst>
-                <a:ext uri="{FF2B5EF4-FFF2-40B4-BE49-F238E27FC236}">
-                  <a16:creationId xmlns:a16="http://schemas.microsoft.com/office/drawing/2014/main" id="{530DDF64-7A5F-CD22-D4E0-E6D58921ECD7}"/>
-                </a:ext>
-              </a:extLst>
-            </p:cNvPr>
-            <p:cNvSpPr txBox="1"/>
-            <p:nvPr/>
-          </p:nvSpPr>
-          <p:spPr>
-            <a:xfrm rot="18936829">
-              <a:off x="3698933" y="1504470"/>
-              <a:ext cx="491393" cy="169277"/>
-            </a:xfrm>
-            <a:prstGeom prst="rect">
-              <a:avLst/>
-            </a:prstGeom>
-            <a:noFill/>
-            <a:ln w="6350">
-              <a:noFill/>
-              <a:prstDash val="dash"/>
-            </a:ln>
-          </p:spPr>
-          <p:txBody>
-            <a:bodyPr wrap="square" lIns="36000" rIns="36000" rtlCol="0">
-              <a:spAutoFit/>
-            </a:bodyPr>
-            <a:lstStyle/>
-            <a:p>
-              <a:pPr algn="ctr"/>
-              <a:r>
-                <a:rPr lang="en-US" sz="500" dirty="0">
-                  <a:latin typeface="Arial" panose="020B0604020202020204" pitchFamily="34" charset="0"/>
-                  <a:cs typeface="Arial" panose="020B0604020202020204" pitchFamily="34" charset="0"/>
-                </a:rPr>
-                <a:t>Member of</a:t>
+                <a:t>.</a:t>
               </a:r>
             </a:p>
           </p:txBody>

</xml_diff>